<commit_message>
Slides and examples about synchronizationContext
</commit_message>
<xml_diff>
--- a/Async Await and their pitfalls.pptx
+++ b/Async Await and their pitfalls.pptx
@@ -8,10 +8,16 @@
     <p:sldId id="256" r:id="rId2"/>
     <p:sldId id="257" r:id="rId3"/>
     <p:sldId id="258" r:id="rId4"/>
-    <p:sldId id="260" r:id="rId5"/>
-    <p:sldId id="259" r:id="rId6"/>
-    <p:sldId id="261" r:id="rId7"/>
-    <p:sldId id="263" r:id="rId8"/>
+    <p:sldId id="264" r:id="rId5"/>
+    <p:sldId id="260" r:id="rId6"/>
+    <p:sldId id="265" r:id="rId7"/>
+    <p:sldId id="259" r:id="rId8"/>
+    <p:sldId id="266" r:id="rId9"/>
+    <p:sldId id="267" r:id="rId10"/>
+    <p:sldId id="261" r:id="rId11"/>
+    <p:sldId id="263" r:id="rId12"/>
+    <p:sldId id="268" r:id="rId13"/>
+    <p:sldId id="269" r:id="rId14"/>
   </p:sldIdLst>
   <p:sldSz cx="12192000" cy="6858000"/>
   <p:notesSz cx="6858000" cy="9144000"/>
@@ -621,7 +627,7 @@
             <a:fld id="{B61BEF0D-F0BB-DE4B-95CE-6DB70DBA9567}" type="datetimeFigureOut">
               <a:rPr lang="en-US" dirty="0"/>
               <a:pPr/>
-              <a:t>3/23/2017</a:t>
+              <a:t>3/27/2017</a:t>
             </a:fld>
             <a:endParaRPr lang="en-US" dirty="0"/>
           </a:p>
@@ -914,7 +920,7 @@
             <a:fld id="{B61BEF0D-F0BB-DE4B-95CE-6DB70DBA9567}" type="datetimeFigureOut">
               <a:rPr lang="en-US" dirty="0"/>
               <a:pPr/>
-              <a:t>3/23/2017</a:t>
+              <a:t>3/27/2017</a:t>
             </a:fld>
             <a:endParaRPr lang="en-US" dirty="0"/>
           </a:p>
@@ -1159,7 +1165,7 @@
             <a:fld id="{B61BEF0D-F0BB-DE4B-95CE-6DB70DBA9567}" type="datetimeFigureOut">
               <a:rPr lang="en-US" dirty="0"/>
               <a:pPr/>
-              <a:t>3/23/2017</a:t>
+              <a:t>3/27/2017</a:t>
             </a:fld>
             <a:endParaRPr lang="en-US" dirty="0"/>
           </a:p>
@@ -1696,7 +1702,7 @@
             <a:fld id="{B61BEF0D-F0BB-DE4B-95CE-6DB70DBA9567}" type="datetimeFigureOut">
               <a:rPr lang="en-US" dirty="0"/>
               <a:pPr/>
-              <a:t>3/23/2017</a:t>
+              <a:t>3/27/2017</a:t>
             </a:fld>
             <a:endParaRPr lang="en-US" dirty="0"/>
           </a:p>
@@ -1941,7 +1947,7 @@
             <a:fld id="{B61BEF0D-F0BB-DE4B-95CE-6DB70DBA9567}" type="datetimeFigureOut">
               <a:rPr lang="en-US" dirty="0"/>
               <a:pPr/>
-              <a:t>3/23/2017</a:t>
+              <a:t>3/27/2017</a:t>
             </a:fld>
             <a:endParaRPr lang="en-US" dirty="0"/>
           </a:p>
@@ -2470,7 +2476,7 @@
             <a:fld id="{B61BEF0D-F0BB-DE4B-95CE-6DB70DBA9567}" type="datetimeFigureOut">
               <a:rPr lang="en-US" dirty="0"/>
               <a:pPr/>
-              <a:t>3/23/2017</a:t>
+              <a:t>3/27/2017</a:t>
             </a:fld>
             <a:endParaRPr lang="en-US" dirty="0"/>
           </a:p>
@@ -2764,7 +2770,7 @@
             <a:fld id="{B61BEF0D-F0BB-DE4B-95CE-6DB70DBA9567}" type="datetimeFigureOut">
               <a:rPr lang="en-US" dirty="0"/>
               <a:pPr/>
-              <a:t>3/23/2017</a:t>
+              <a:t>3/27/2017</a:t>
             </a:fld>
             <a:endParaRPr lang="en-US" dirty="0"/>
           </a:p>
@@ -2935,7 +2941,7 @@
             <a:fld id="{B61BEF0D-F0BB-DE4B-95CE-6DB70DBA9567}" type="datetimeFigureOut">
               <a:rPr lang="en-US" dirty="0"/>
               <a:pPr/>
-              <a:t>3/23/2017</a:t>
+              <a:t>3/27/2017</a:t>
             </a:fld>
             <a:endParaRPr lang="en-US" dirty="0"/>
           </a:p>
@@ -3112,7 +3118,7 @@
             <a:fld id="{B61BEF0D-F0BB-DE4B-95CE-6DB70DBA9567}" type="datetimeFigureOut">
               <a:rPr lang="en-US" dirty="0"/>
               <a:pPr/>
-              <a:t>3/23/2017</a:t>
+              <a:t>3/27/2017</a:t>
             </a:fld>
             <a:endParaRPr lang="en-US" dirty="0"/>
           </a:p>
@@ -3320,7 +3326,7 @@
             <a:fld id="{B61BEF0D-F0BB-DE4B-95CE-6DB70DBA9567}" type="datetimeFigureOut">
               <a:rPr lang="en-US" dirty="0"/>
               <a:pPr/>
-              <a:t>3/23/2017</a:t>
+              <a:t>3/27/2017</a:t>
             </a:fld>
             <a:endParaRPr lang="en-US" dirty="0"/>
           </a:p>
@@ -3568,7 +3574,7 @@
             <a:fld id="{B61BEF0D-F0BB-DE4B-95CE-6DB70DBA9567}" type="datetimeFigureOut">
               <a:rPr lang="en-US" dirty="0"/>
               <a:pPr/>
-              <a:t>3/23/2017</a:t>
+              <a:t>3/27/2017</a:t>
             </a:fld>
             <a:endParaRPr lang="en-US" dirty="0"/>
           </a:p>
@@ -3912,7 +3918,7 @@
             <a:fld id="{B61BEF0D-F0BB-DE4B-95CE-6DB70DBA9567}" type="datetimeFigureOut">
               <a:rPr lang="en-US" dirty="0"/>
               <a:pPr/>
-              <a:t>3/23/2017</a:t>
+              <a:t>3/27/2017</a:t>
             </a:fld>
             <a:endParaRPr lang="en-US" dirty="0"/>
           </a:p>
@@ -4401,7 +4407,7 @@
             <a:fld id="{B61BEF0D-F0BB-DE4B-95CE-6DB70DBA9567}" type="datetimeFigureOut">
               <a:rPr lang="en-US" dirty="0"/>
               <a:pPr/>
-              <a:t>3/23/2017</a:t>
+              <a:t>3/27/2017</a:t>
             </a:fld>
             <a:endParaRPr lang="en-US" dirty="0"/>
           </a:p>
@@ -4516,7 +4522,7 @@
             <a:fld id="{B61BEF0D-F0BB-DE4B-95CE-6DB70DBA9567}" type="datetimeFigureOut">
               <a:rPr lang="en-US" dirty="0"/>
               <a:pPr/>
-              <a:t>3/23/2017</a:t>
+              <a:t>3/27/2017</a:t>
             </a:fld>
             <a:endParaRPr lang="en-US" dirty="0"/>
           </a:p>
@@ -4608,7 +4614,7 @@
             <a:fld id="{B61BEF0D-F0BB-DE4B-95CE-6DB70DBA9567}" type="datetimeFigureOut">
               <a:rPr lang="en-US" dirty="0"/>
               <a:pPr/>
-              <a:t>3/23/2017</a:t>
+              <a:t>3/27/2017</a:t>
             </a:fld>
             <a:endParaRPr lang="en-US" dirty="0"/>
           </a:p>
@@ -4888,7 +4894,7 @@
             <a:fld id="{B61BEF0D-F0BB-DE4B-95CE-6DB70DBA9567}" type="datetimeFigureOut">
               <a:rPr lang="en-US" dirty="0"/>
               <a:pPr/>
-              <a:t>3/23/2017</a:t>
+              <a:t>3/27/2017</a:t>
             </a:fld>
             <a:endParaRPr lang="en-US" dirty="0"/>
           </a:p>
@@ -5176,7 +5182,7 @@
             <a:fld id="{B61BEF0D-F0BB-DE4B-95CE-6DB70DBA9567}" type="datetimeFigureOut">
               <a:rPr lang="en-US" dirty="0"/>
               <a:pPr/>
-              <a:t>3/23/2017</a:t>
+              <a:t>3/27/2017</a:t>
             </a:fld>
             <a:endParaRPr lang="en-US" dirty="0"/>
           </a:p>
@@ -5703,7 +5709,7 @@
             <a:fld id="{B61BEF0D-F0BB-DE4B-95CE-6DB70DBA9567}" type="datetimeFigureOut">
               <a:rPr lang="en-US" dirty="0"/>
               <a:pPr/>
-              <a:t>3/23/2017</a:t>
+              <a:t>3/27/2017</a:t>
             </a:fld>
             <a:endParaRPr lang="en-US" dirty="0"/>
           </a:p>
@@ -6262,10 +6268,549 @@
           </a:p>
         </p:txBody>
       </p:sp>
+      <p:sp>
+        <p:nvSpPr>
+          <p:cNvPr id="3" name="TextBox 2"/>
+          <p:cNvSpPr txBox="1"/>
+          <p:nvPr/>
+        </p:nvSpPr>
+        <p:spPr>
+          <a:xfrm>
+            <a:off x="5683481" y="5595582"/>
+            <a:ext cx="6449010" cy="707886"/>
+          </a:xfrm>
+          <a:prstGeom prst="rect">
+            <a:avLst/>
+          </a:prstGeom>
+          <a:noFill/>
+        </p:spPr>
+        <p:txBody>
+          <a:bodyPr wrap="none" rtlCol="0">
+            <a:spAutoFit/>
+          </a:bodyPr>
+          <a:lstStyle/>
+          <a:p>
+            <a:r>
+              <a:rPr lang="en-US" sz="2000" dirty="0"/>
+              <a:t>Source code: </a:t>
+            </a:r>
+            <a:r>
+              <a:rPr lang="en-US" sz="2000" dirty="0">
+                <a:hlinkClick r:id="rId2"/>
+              </a:rPr>
+              <a:t>https://github.com/sflusov/AsyncAwaitPitfalls</a:t>
+            </a:r>
+            <a:endParaRPr lang="en-US" sz="2000" dirty="0"/>
+          </a:p>
+          <a:p>
+            <a:endParaRPr lang="ru-RU" sz="2000" dirty="0"/>
+          </a:p>
+        </p:txBody>
+      </p:sp>
     </p:spTree>
     <p:extLst>
       <p:ext uri="{BB962C8B-B14F-4D97-AF65-F5344CB8AC3E}">
         <p14:creationId xmlns:p14="http://schemas.microsoft.com/office/powerpoint/2010/main" val="4117756118"/>
+      </p:ext>
+    </p:extLst>
+  </p:cSld>
+  <p:clrMapOvr>
+    <a:masterClrMapping/>
+  </p:clrMapOvr>
+</p:sld>
+</file>
+
+<file path=ppt/slides/slide10.xml><?xml version="1.0" encoding="utf-8"?>
+<p:sld xmlns:a="http://schemas.openxmlformats.org/drawingml/2006/main" xmlns:r="http://schemas.openxmlformats.org/officeDocument/2006/relationships" xmlns:p="http://schemas.openxmlformats.org/presentationml/2006/main">
+  <p:cSld>
+    <p:spTree>
+      <p:nvGrpSpPr>
+        <p:cNvPr id="1" name=""/>
+        <p:cNvGrpSpPr/>
+        <p:nvPr/>
+      </p:nvGrpSpPr>
+      <p:grpSpPr>
+        <a:xfrm>
+          <a:off x="0" y="0"/>
+          <a:ext cx="0" cy="0"/>
+          <a:chOff x="0" y="0"/>
+          <a:chExt cx="0" cy="0"/>
+        </a:xfrm>
+      </p:grpSpPr>
+      <p:sp>
+        <p:nvSpPr>
+          <p:cNvPr id="2" name="Заголовок 1"/>
+          <p:cNvSpPr>
+            <a:spLocks noGrp="1"/>
+          </p:cNvSpPr>
+          <p:nvPr>
+            <p:ph type="title"/>
+          </p:nvPr>
+        </p:nvSpPr>
+        <p:spPr>
+          <a:xfrm>
+            <a:off x="1381674" y="46175"/>
+            <a:ext cx="10018713" cy="625764"/>
+          </a:xfrm>
+        </p:spPr>
+        <p:txBody>
+          <a:bodyPr>
+            <a:normAutofit fontScale="90000"/>
+          </a:bodyPr>
+          <a:lstStyle/>
+          <a:p>
+            <a:r>
+              <a:rPr lang="en-US" dirty="0"/>
+              <a:t>When at last you “await”?</a:t>
+            </a:r>
+            <a:r>
+              <a:rPr lang="ru-RU" dirty="0"/>
+              <a:t> (</a:t>
+            </a:r>
+            <a:r>
+              <a:rPr lang="en-US" dirty="0"/>
+              <a:t>Part 1) </a:t>
+            </a:r>
+            <a:endParaRPr lang="ru-RU" dirty="0"/>
+          </a:p>
+        </p:txBody>
+      </p:sp>
+      <p:pic>
+        <p:nvPicPr>
+          <p:cNvPr id="8" name="Рисунок 7"/>
+          <p:cNvPicPr>
+            <a:picLocks noChangeAspect="1"/>
+          </p:cNvPicPr>
+          <p:nvPr/>
+        </p:nvPicPr>
+        <p:blipFill>
+          <a:blip r:embed="rId2"/>
+          <a:stretch>
+            <a:fillRect/>
+          </a:stretch>
+        </p:blipFill>
+        <p:spPr>
+          <a:xfrm>
+            <a:off x="2230017" y="906688"/>
+            <a:ext cx="5882047" cy="5410135"/>
+          </a:xfrm>
+          <a:prstGeom prst="rect">
+            <a:avLst/>
+          </a:prstGeom>
+        </p:spPr>
+      </p:pic>
+      <p:sp>
+        <p:nvSpPr>
+          <p:cNvPr id="9" name="TextBox 8"/>
+          <p:cNvSpPr txBox="1"/>
+          <p:nvPr/>
+        </p:nvSpPr>
+        <p:spPr>
+          <a:xfrm>
+            <a:off x="8478812" y="1026758"/>
+            <a:ext cx="3439486" cy="3416320"/>
+          </a:xfrm>
+          <a:prstGeom prst="rect">
+            <a:avLst/>
+          </a:prstGeom>
+          <a:noFill/>
+        </p:spPr>
+        <p:txBody>
+          <a:bodyPr wrap="square" rtlCol="0">
+            <a:spAutoFit/>
+          </a:bodyPr>
+          <a:lstStyle/>
+          <a:p>
+            <a:r>
+              <a:rPr lang="en-US" dirty="0"/>
+              <a:t>Goals:</a:t>
+            </a:r>
+          </a:p>
+          <a:p>
+            <a:pPr marL="342900" indent="-342900">
+              <a:buFont typeface="+mj-lt"/>
+              <a:buAutoNum type="arabicPeriod"/>
+            </a:pPr>
+            <a:r>
+              <a:rPr lang="en-US" dirty="0"/>
+              <a:t>I want to mix asynchronous and synchronous methods for better performance</a:t>
+            </a:r>
+            <a:endParaRPr lang="ru-RU" dirty="0"/>
+          </a:p>
+          <a:p>
+            <a:endParaRPr lang="en-US" dirty="0"/>
+          </a:p>
+          <a:p>
+            <a:r>
+              <a:rPr lang="en-US" dirty="0"/>
+              <a:t>Questions:</a:t>
+            </a:r>
+          </a:p>
+          <a:p>
+            <a:pPr marL="342900" indent="-342900">
+              <a:buFont typeface="+mj-lt"/>
+              <a:buAutoNum type="arabicPeriod"/>
+            </a:pPr>
+            <a:r>
+              <a:rPr lang="en-US" dirty="0"/>
+              <a:t>What problems does this code contains?</a:t>
+            </a:r>
+          </a:p>
+          <a:p>
+            <a:pPr marL="342900" indent="-342900">
+              <a:buFont typeface="+mj-lt"/>
+              <a:buAutoNum type="arabicPeriod"/>
+            </a:pPr>
+            <a:r>
+              <a:rPr lang="en-US" dirty="0"/>
+              <a:t>How we should resolve this problem?</a:t>
+            </a:r>
+          </a:p>
+          <a:p>
+            <a:pPr marL="342900" indent="-342900">
+              <a:buFont typeface="+mj-lt"/>
+              <a:buAutoNum type="arabicPeriod"/>
+            </a:pPr>
+            <a:endParaRPr lang="en-US" dirty="0"/>
+          </a:p>
+          <a:p>
+            <a:endParaRPr lang="ru-RU" dirty="0"/>
+          </a:p>
+        </p:txBody>
+      </p:sp>
+    </p:spTree>
+    <p:extLst>
+      <p:ext uri="{BB962C8B-B14F-4D97-AF65-F5344CB8AC3E}">
+        <p14:creationId xmlns:p14="http://schemas.microsoft.com/office/powerpoint/2010/main" val="2386486941"/>
+      </p:ext>
+    </p:extLst>
+  </p:cSld>
+  <p:clrMapOvr>
+    <a:masterClrMapping/>
+  </p:clrMapOvr>
+</p:sld>
+</file>
+
+<file path=ppt/slides/slide11.xml><?xml version="1.0" encoding="utf-8"?>
+<p:sld xmlns:a="http://schemas.openxmlformats.org/drawingml/2006/main" xmlns:r="http://schemas.openxmlformats.org/officeDocument/2006/relationships" xmlns:p="http://schemas.openxmlformats.org/presentationml/2006/main">
+  <p:cSld>
+    <p:spTree>
+      <p:nvGrpSpPr>
+        <p:cNvPr id="1" name=""/>
+        <p:cNvGrpSpPr/>
+        <p:nvPr/>
+      </p:nvGrpSpPr>
+      <p:grpSpPr>
+        <a:xfrm>
+          <a:off x="0" y="0"/>
+          <a:ext cx="0" cy="0"/>
+          <a:chOff x="0" y="0"/>
+          <a:chExt cx="0" cy="0"/>
+        </a:xfrm>
+      </p:grpSpPr>
+      <p:sp>
+        <p:nvSpPr>
+          <p:cNvPr id="2" name="Заголовок 1"/>
+          <p:cNvSpPr>
+            <a:spLocks noGrp="1"/>
+          </p:cNvSpPr>
+          <p:nvPr>
+            <p:ph type="title"/>
+          </p:nvPr>
+        </p:nvSpPr>
+        <p:spPr>
+          <a:xfrm>
+            <a:off x="1381674" y="46175"/>
+            <a:ext cx="10018713" cy="625764"/>
+          </a:xfrm>
+        </p:spPr>
+        <p:txBody>
+          <a:bodyPr>
+            <a:normAutofit fontScale="90000"/>
+          </a:bodyPr>
+          <a:lstStyle/>
+          <a:p>
+            <a:r>
+              <a:rPr lang="en-US" dirty="0"/>
+              <a:t>When at last you “await”?</a:t>
+            </a:r>
+            <a:r>
+              <a:rPr lang="ru-RU" dirty="0"/>
+              <a:t> (</a:t>
+            </a:r>
+            <a:r>
+              <a:rPr lang="en-US" dirty="0"/>
+              <a:t>Part 2) </a:t>
+            </a:r>
+            <a:endParaRPr lang="ru-RU" dirty="0"/>
+          </a:p>
+        </p:txBody>
+      </p:sp>
+      <p:sp>
+        <p:nvSpPr>
+          <p:cNvPr id="9" name="TextBox 8"/>
+          <p:cNvSpPr txBox="1"/>
+          <p:nvPr/>
+        </p:nvSpPr>
+        <p:spPr>
+          <a:xfrm>
+            <a:off x="8478812" y="1026758"/>
+            <a:ext cx="3439486" cy="3416320"/>
+          </a:xfrm>
+          <a:prstGeom prst="rect">
+            <a:avLst/>
+          </a:prstGeom>
+          <a:noFill/>
+        </p:spPr>
+        <p:txBody>
+          <a:bodyPr wrap="square" rtlCol="0">
+            <a:spAutoFit/>
+          </a:bodyPr>
+          <a:lstStyle/>
+          <a:p>
+            <a:r>
+              <a:rPr lang="en-US" dirty="0"/>
+              <a:t>Goals:</a:t>
+            </a:r>
+          </a:p>
+          <a:p>
+            <a:pPr marL="342900" indent="-342900">
+              <a:buFont typeface="+mj-lt"/>
+              <a:buAutoNum type="arabicPeriod"/>
+            </a:pPr>
+            <a:r>
+              <a:rPr lang="en-US" dirty="0"/>
+              <a:t>I want to mix asynchronous and synchronous methods for better performance</a:t>
+            </a:r>
+            <a:endParaRPr lang="ru-RU" dirty="0"/>
+          </a:p>
+          <a:p>
+            <a:endParaRPr lang="en-US" dirty="0"/>
+          </a:p>
+          <a:p>
+            <a:r>
+              <a:rPr lang="en-US" dirty="0"/>
+              <a:t>Questions:</a:t>
+            </a:r>
+          </a:p>
+          <a:p>
+            <a:pPr marL="342900" indent="-342900">
+              <a:buFont typeface="+mj-lt"/>
+              <a:buAutoNum type="arabicPeriod"/>
+            </a:pPr>
+            <a:r>
+              <a:rPr lang="en-US" dirty="0"/>
+              <a:t>What problems does this code contains?</a:t>
+            </a:r>
+          </a:p>
+          <a:p>
+            <a:pPr marL="342900" indent="-342900">
+              <a:buFont typeface="+mj-lt"/>
+              <a:buAutoNum type="arabicPeriod"/>
+            </a:pPr>
+            <a:r>
+              <a:rPr lang="en-US" dirty="0"/>
+              <a:t>How we should resolve this problem?</a:t>
+            </a:r>
+          </a:p>
+          <a:p>
+            <a:pPr marL="342900" indent="-342900">
+              <a:buFont typeface="+mj-lt"/>
+              <a:buAutoNum type="arabicPeriod"/>
+            </a:pPr>
+            <a:endParaRPr lang="en-US" dirty="0"/>
+          </a:p>
+          <a:p>
+            <a:endParaRPr lang="ru-RU" dirty="0"/>
+          </a:p>
+        </p:txBody>
+      </p:sp>
+      <p:pic>
+        <p:nvPicPr>
+          <p:cNvPr id="3" name="Рисунок 2"/>
+          <p:cNvPicPr>
+            <a:picLocks noChangeAspect="1"/>
+          </p:cNvPicPr>
+          <p:nvPr/>
+        </p:nvPicPr>
+        <p:blipFill>
+          <a:blip r:embed="rId2"/>
+          <a:stretch>
+            <a:fillRect/>
+          </a:stretch>
+        </p:blipFill>
+        <p:spPr>
+          <a:xfrm>
+            <a:off x="1717577" y="779978"/>
+            <a:ext cx="4823182" cy="5966198"/>
+          </a:xfrm>
+          <a:prstGeom prst="rect">
+            <a:avLst/>
+          </a:prstGeom>
+        </p:spPr>
+      </p:pic>
+    </p:spTree>
+    <p:extLst>
+      <p:ext uri="{BB962C8B-B14F-4D97-AF65-F5344CB8AC3E}">
+        <p14:creationId xmlns:p14="http://schemas.microsoft.com/office/powerpoint/2010/main" val="894802718"/>
+      </p:ext>
+    </p:extLst>
+  </p:cSld>
+  <p:clrMapOvr>
+    <a:masterClrMapping/>
+  </p:clrMapOvr>
+</p:sld>
+</file>
+
+<file path=ppt/slides/slide12.xml><?xml version="1.0" encoding="utf-8"?>
+<p:sld xmlns:a="http://schemas.openxmlformats.org/drawingml/2006/main" xmlns:r="http://schemas.openxmlformats.org/officeDocument/2006/relationships" xmlns:p="http://schemas.openxmlformats.org/presentationml/2006/main">
+  <p:cSld>
+    <p:spTree>
+      <p:nvGrpSpPr>
+        <p:cNvPr id="1" name=""/>
+        <p:cNvGrpSpPr/>
+        <p:nvPr/>
+      </p:nvGrpSpPr>
+      <p:grpSpPr>
+        <a:xfrm>
+          <a:off x="0" y="0"/>
+          <a:ext cx="0" cy="0"/>
+          <a:chOff x="0" y="0"/>
+          <a:chExt cx="0" cy="0"/>
+        </a:xfrm>
+      </p:grpSpPr>
+      <p:sp>
+        <p:nvSpPr>
+          <p:cNvPr id="2" name="Заголовок 1"/>
+          <p:cNvSpPr>
+            <a:spLocks noGrp="1"/>
+          </p:cNvSpPr>
+          <p:nvPr>
+            <p:ph type="title"/>
+          </p:nvPr>
+        </p:nvSpPr>
+        <p:spPr>
+          <a:xfrm>
+            <a:off x="1484311" y="316348"/>
+            <a:ext cx="10018713" cy="690418"/>
+          </a:xfrm>
+        </p:spPr>
+        <p:txBody>
+          <a:bodyPr>
+            <a:normAutofit fontScale="90000"/>
+          </a:bodyPr>
+          <a:lstStyle/>
+          <a:p>
+            <a:r>
+              <a:rPr lang="en-US" dirty="0"/>
+              <a:t>Where I can’t use “await”?</a:t>
+            </a:r>
+            <a:endParaRPr lang="ru-RU" dirty="0"/>
+          </a:p>
+        </p:txBody>
+      </p:sp>
+      <p:sp>
+        <p:nvSpPr>
+          <p:cNvPr id="3" name="Объект 2"/>
+          <p:cNvSpPr>
+            <a:spLocks noGrp="1"/>
+          </p:cNvSpPr>
+          <p:nvPr>
+            <p:ph idx="1"/>
+          </p:nvPr>
+        </p:nvSpPr>
+        <p:spPr/>
+        <p:txBody>
+          <a:bodyPr/>
+          <a:lstStyle/>
+          <a:p>
+            <a:endParaRPr lang="ru-RU"/>
+          </a:p>
+        </p:txBody>
+      </p:sp>
+    </p:spTree>
+    <p:extLst>
+      <p:ext uri="{BB962C8B-B14F-4D97-AF65-F5344CB8AC3E}">
+        <p14:creationId xmlns:p14="http://schemas.microsoft.com/office/powerpoint/2010/main" val="4084537470"/>
+      </p:ext>
+    </p:extLst>
+  </p:cSld>
+  <p:clrMapOvr>
+    <a:masterClrMapping/>
+  </p:clrMapOvr>
+</p:sld>
+</file>
+
+<file path=ppt/slides/slide13.xml><?xml version="1.0" encoding="utf-8"?>
+<p:sld xmlns:a="http://schemas.openxmlformats.org/drawingml/2006/main" xmlns:r="http://schemas.openxmlformats.org/officeDocument/2006/relationships" xmlns:p="http://schemas.openxmlformats.org/presentationml/2006/main">
+  <p:cSld>
+    <p:spTree>
+      <p:nvGrpSpPr>
+        <p:cNvPr id="1" name=""/>
+        <p:cNvGrpSpPr/>
+        <p:nvPr/>
+      </p:nvGrpSpPr>
+      <p:grpSpPr>
+        <a:xfrm>
+          <a:off x="0" y="0"/>
+          <a:ext cx="0" cy="0"/>
+          <a:chOff x="0" y="0"/>
+          <a:chExt cx="0" cy="0"/>
+        </a:xfrm>
+      </p:grpSpPr>
+      <p:sp>
+        <p:nvSpPr>
+          <p:cNvPr id="2" name="Заголовок 1"/>
+          <p:cNvSpPr>
+            <a:spLocks noGrp="1"/>
+          </p:cNvSpPr>
+          <p:nvPr>
+            <p:ph type="title"/>
+          </p:nvPr>
+        </p:nvSpPr>
+        <p:spPr>
+          <a:xfrm>
+            <a:off x="1484311" y="316348"/>
+            <a:ext cx="10018713" cy="690418"/>
+          </a:xfrm>
+        </p:spPr>
+        <p:txBody>
+          <a:bodyPr>
+            <a:normAutofit fontScale="90000"/>
+          </a:bodyPr>
+          <a:lstStyle/>
+          <a:p>
+            <a:r>
+              <a:rPr lang="en-US" dirty="0"/>
+              <a:t>What happens when I combining "await" and loop.</a:t>
+            </a:r>
+            <a:endParaRPr lang="ru-RU" dirty="0"/>
+          </a:p>
+        </p:txBody>
+      </p:sp>
+      <p:sp>
+        <p:nvSpPr>
+          <p:cNvPr id="3" name="Объект 2"/>
+          <p:cNvSpPr>
+            <a:spLocks noGrp="1"/>
+          </p:cNvSpPr>
+          <p:nvPr>
+            <p:ph idx="1"/>
+          </p:nvPr>
+        </p:nvSpPr>
+        <p:spPr/>
+        <p:txBody>
+          <a:bodyPr/>
+          <a:lstStyle/>
+          <a:p>
+            <a:endParaRPr lang="ru-RU" dirty="0"/>
+          </a:p>
+        </p:txBody>
+      </p:sp>
+    </p:spTree>
+    <p:extLst>
+      <p:ext uri="{BB962C8B-B14F-4D97-AF65-F5344CB8AC3E}">
+        <p14:creationId xmlns:p14="http://schemas.microsoft.com/office/powerpoint/2010/main" val="4269881390"/>
       </p:ext>
     </p:extLst>
   </p:cSld>
@@ -6514,8 +7059,8 @@
         </p:nvSpPr>
         <p:spPr>
           <a:xfrm>
-            <a:off x="8414158" y="1686187"/>
-            <a:ext cx="3439486" cy="5355312"/>
+            <a:off x="8414158" y="935564"/>
+            <a:ext cx="3439486" cy="5909310"/>
           </a:xfrm>
           <a:prstGeom prst="rect">
             <a:avLst/>
@@ -6553,7 +7098,30 @@
             </a:r>
           </a:p>
           <a:p>
-            <a:endParaRPr lang="en-US" dirty="0"/>
+            <a:pPr marL="342900" indent="-342900">
+              <a:buFont typeface="+mj-lt"/>
+              <a:buAutoNum type="arabicPeriod"/>
+            </a:pPr>
+            <a:r>
+              <a:rPr lang="en-US" dirty="0"/>
+              <a:t>Should I always use "</a:t>
+            </a:r>
+            <a:r>
+              <a:rPr lang="en-US" dirty="0" err="1"/>
+              <a:t>async</a:t>
+            </a:r>
+            <a:r>
+              <a:rPr lang="en-US" dirty="0"/>
+              <a:t> await" for creation </a:t>
+            </a:r>
+            <a:r>
+              <a:rPr lang="en-US" dirty="0" err="1"/>
+              <a:t>async</a:t>
+            </a:r>
+            <a:r>
+              <a:rPr lang="en-US" dirty="0"/>
+              <a:t>-method of controller?</a:t>
+            </a:r>
           </a:p>
           <a:p>
             <a:pPr marL="342900" indent="-342900">
@@ -6649,8 +7217,8 @@
         </p:nvSpPr>
         <p:spPr>
           <a:xfrm>
-            <a:off x="1484311" y="288643"/>
-            <a:ext cx="10018713" cy="586409"/>
+            <a:off x="1484311" y="685800"/>
+            <a:ext cx="10018713" cy="699655"/>
           </a:xfrm>
         </p:spPr>
         <p:txBody>
@@ -6661,6 +7229,102 @@
           <a:p>
             <a:r>
               <a:rPr lang="en-US" dirty="0"/>
+              <a:t>Conclusion from slide</a:t>
+            </a:r>
+            <a:endParaRPr lang="ru-RU" dirty="0"/>
+          </a:p>
+        </p:txBody>
+      </p:sp>
+      <p:sp>
+        <p:nvSpPr>
+          <p:cNvPr id="3" name="Объект 2"/>
+          <p:cNvSpPr>
+            <a:spLocks noGrp="1"/>
+          </p:cNvSpPr>
+          <p:nvPr>
+            <p:ph idx="1"/>
+          </p:nvPr>
+        </p:nvSpPr>
+        <p:spPr>
+          <a:xfrm>
+            <a:off x="1484310" y="1650999"/>
+            <a:ext cx="10018713" cy="3124201"/>
+          </a:xfrm>
+        </p:spPr>
+        <p:txBody>
+          <a:bodyPr/>
+          <a:lstStyle/>
+          <a:p>
+            <a:r>
+              <a:rPr lang="en-US" dirty="0"/>
+              <a:t>You can create asynchronous method based on "Task" without use keyword "</a:t>
+            </a:r>
+            <a:r>
+              <a:rPr lang="en-US" dirty="0" err="1"/>
+              <a:t>async</a:t>
+            </a:r>
+            <a:r>
+              <a:rPr lang="en-US" dirty="0"/>
+              <a:t> await" on top level.</a:t>
+            </a:r>
+            <a:endParaRPr lang="ru-RU" dirty="0"/>
+          </a:p>
+        </p:txBody>
+      </p:sp>
+    </p:spTree>
+    <p:extLst>
+      <p:ext uri="{BB962C8B-B14F-4D97-AF65-F5344CB8AC3E}">
+        <p14:creationId xmlns:p14="http://schemas.microsoft.com/office/powerpoint/2010/main" val="3986909379"/>
+      </p:ext>
+    </p:extLst>
+  </p:cSld>
+  <p:clrMapOvr>
+    <a:masterClrMapping/>
+  </p:clrMapOvr>
+</p:sld>
+</file>
+
+<file path=ppt/slides/slide5.xml><?xml version="1.0" encoding="utf-8"?>
+<p:sld xmlns:a="http://schemas.openxmlformats.org/drawingml/2006/main" xmlns:r="http://schemas.openxmlformats.org/officeDocument/2006/relationships" xmlns:p="http://schemas.openxmlformats.org/presentationml/2006/main">
+  <p:cSld>
+    <p:spTree>
+      <p:nvGrpSpPr>
+        <p:cNvPr id="1" name=""/>
+        <p:cNvGrpSpPr/>
+        <p:nvPr/>
+      </p:nvGrpSpPr>
+      <p:grpSpPr>
+        <a:xfrm>
+          <a:off x="0" y="0"/>
+          <a:ext cx="0" cy="0"/>
+          <a:chOff x="0" y="0"/>
+          <a:chExt cx="0" cy="0"/>
+        </a:xfrm>
+      </p:grpSpPr>
+      <p:sp>
+        <p:nvSpPr>
+          <p:cNvPr id="2" name="Заголовок 1"/>
+          <p:cNvSpPr>
+            <a:spLocks noGrp="1"/>
+          </p:cNvSpPr>
+          <p:nvPr>
+            <p:ph type="title"/>
+          </p:nvPr>
+        </p:nvSpPr>
+        <p:spPr>
+          <a:xfrm>
+            <a:off x="1484311" y="0"/>
+            <a:ext cx="10018713" cy="1355341"/>
+          </a:xfrm>
+        </p:spPr>
+        <p:txBody>
+          <a:bodyPr>
+            <a:normAutofit/>
+          </a:bodyPr>
+          <a:lstStyle/>
+          <a:p>
+            <a:r>
+              <a:rPr lang="en-US" dirty="0"/>
               <a:t>The simplest example with </a:t>
             </a:r>
             <a:r>
@@ -6671,7 +7335,14 @@
               <a:rPr lang="en-US" dirty="0"/>
               <a:t> void method</a:t>
             </a:r>
-            <a:endParaRPr lang="ru-RU" dirty="0"/>
+            <a:br>
+              <a:rPr lang="en-US" dirty="0"/>
+            </a:br>
+            <a:r>
+              <a:rPr lang="en-US" sz="2800" dirty="0"/>
+              <a:t>Where I can’t use “await”?</a:t>
+            </a:r>
+            <a:endParaRPr lang="ru-RU" sz="2800" dirty="0"/>
           </a:p>
         </p:txBody>
       </p:sp>
@@ -6808,7 +7479,7 @@
 </p:sld>
 </file>
 
-<file path=ppt/slides/slide5.xml><?xml version="1.0" encoding="utf-8"?>
+<file path=ppt/slides/slide6.xml><?xml version="1.0" encoding="utf-8"?>
 <p:sld xmlns:a="http://schemas.openxmlformats.org/drawingml/2006/main" xmlns:r="http://schemas.openxmlformats.org/officeDocument/2006/relationships" xmlns:p="http://schemas.openxmlformats.org/presentationml/2006/main">
   <p:cSld>
     <p:spTree>
@@ -6837,8 +7508,174 @@
         </p:nvSpPr>
         <p:spPr>
           <a:xfrm>
+            <a:off x="1484311" y="685801"/>
+            <a:ext cx="10018713" cy="838200"/>
+          </a:xfrm>
+        </p:spPr>
+        <p:txBody>
+          <a:bodyPr/>
+          <a:lstStyle/>
+          <a:p>
+            <a:r>
+              <a:rPr lang="en-US" dirty="0"/>
+              <a:t>Conclusion from slide</a:t>
+            </a:r>
+            <a:endParaRPr lang="ru-RU" dirty="0"/>
+          </a:p>
+        </p:txBody>
+      </p:sp>
+      <p:sp>
+        <p:nvSpPr>
+          <p:cNvPr id="3" name="Объект 2"/>
+          <p:cNvSpPr>
+            <a:spLocks noGrp="1"/>
+          </p:cNvSpPr>
+          <p:nvPr>
+            <p:ph idx="1"/>
+          </p:nvPr>
+        </p:nvSpPr>
+        <p:spPr>
+          <a:xfrm>
+            <a:off x="1484310" y="2537690"/>
+            <a:ext cx="10018713" cy="2182092"/>
+          </a:xfrm>
+        </p:spPr>
+        <p:txBody>
+          <a:bodyPr/>
+          <a:lstStyle/>
+          <a:p>
+            <a:r>
+              <a:rPr lang="en-US" dirty="0"/>
+              <a:t>Avoid </a:t>
+            </a:r>
+            <a:r>
+              <a:rPr lang="en-US" dirty="0" err="1"/>
+              <a:t>async</a:t>
+            </a:r>
+            <a:r>
+              <a:rPr lang="en-US" dirty="0"/>
+              <a:t> void. Prefer </a:t>
+            </a:r>
+            <a:r>
+              <a:rPr lang="en-US" dirty="0" err="1"/>
+              <a:t>async</a:t>
+            </a:r>
+            <a:r>
+              <a:rPr lang="en-US" dirty="0"/>
+              <a:t> Task methods over </a:t>
+            </a:r>
+            <a:r>
+              <a:rPr lang="en-US" dirty="0" err="1"/>
+              <a:t>async</a:t>
+            </a:r>
+            <a:r>
+              <a:rPr lang="en-US" dirty="0"/>
+              <a:t> void methods.</a:t>
+            </a:r>
+          </a:p>
+          <a:p>
+            <a:r>
+              <a:rPr lang="en-US" dirty="0"/>
+              <a:t>Exception: Event handlers (fire &amp; forget) </a:t>
+            </a:r>
+            <a:endParaRPr lang="ru-RU" dirty="0"/>
+          </a:p>
+        </p:txBody>
+      </p:sp>
+      <p:sp>
+        <p:nvSpPr>
+          <p:cNvPr id="6" name="TextBox 5"/>
+          <p:cNvSpPr txBox="1"/>
+          <p:nvPr/>
+        </p:nvSpPr>
+        <p:spPr>
+          <a:xfrm>
+            <a:off x="5362578" y="5890595"/>
+            <a:ext cx="6829422" cy="646331"/>
+          </a:xfrm>
+          <a:prstGeom prst="rect">
+            <a:avLst/>
+          </a:prstGeom>
+          <a:noFill/>
+        </p:spPr>
+        <p:txBody>
+          <a:bodyPr wrap="square" rtlCol="0">
+            <a:spAutoFit/>
+          </a:bodyPr>
+          <a:lstStyle/>
+          <a:p>
+            <a:r>
+              <a:rPr lang="en-US" dirty="0"/>
+              <a:t>Source: </a:t>
+            </a:r>
+            <a:r>
+              <a:rPr lang="en-US" dirty="0">
+                <a:hlinkClick r:id="rId2"/>
+              </a:rPr>
+              <a:t>https://msdn.microsoft.com/en-us/magazine/jj991977.aspx</a:t>
+            </a:r>
+            <a:endParaRPr lang="en-US" dirty="0"/>
+          </a:p>
+          <a:p>
+            <a:r>
+              <a:rPr lang="en-US" dirty="0"/>
+              <a:t>Paragraph: Avoid </a:t>
+            </a:r>
+            <a:r>
+              <a:rPr lang="en-US" dirty="0" err="1"/>
+              <a:t>Async</a:t>
+            </a:r>
+            <a:r>
+              <a:rPr lang="en-US" dirty="0"/>
+              <a:t> Void</a:t>
+            </a:r>
+          </a:p>
+        </p:txBody>
+      </p:sp>
+    </p:spTree>
+    <p:extLst>
+      <p:ext uri="{BB962C8B-B14F-4D97-AF65-F5344CB8AC3E}">
+        <p14:creationId xmlns:p14="http://schemas.microsoft.com/office/powerpoint/2010/main" val="4079962869"/>
+      </p:ext>
+    </p:extLst>
+  </p:cSld>
+  <p:clrMapOvr>
+    <a:masterClrMapping/>
+  </p:clrMapOvr>
+</p:sld>
+</file>
+
+<file path=ppt/slides/slide7.xml><?xml version="1.0" encoding="utf-8"?>
+<p:sld xmlns:a="http://schemas.openxmlformats.org/drawingml/2006/main" xmlns:r="http://schemas.openxmlformats.org/officeDocument/2006/relationships" xmlns:p="http://schemas.openxmlformats.org/presentationml/2006/main">
+  <p:cSld>
+    <p:spTree>
+      <p:nvGrpSpPr>
+        <p:cNvPr id="1" name=""/>
+        <p:cNvGrpSpPr/>
+        <p:nvPr/>
+      </p:nvGrpSpPr>
+      <p:grpSpPr>
+        <a:xfrm>
+          <a:off x="0" y="0"/>
+          <a:ext cx="0" cy="0"/>
+          <a:chOff x="0" y="0"/>
+          <a:chExt cx="0" cy="0"/>
+        </a:xfrm>
+      </p:grpSpPr>
+      <p:sp>
+        <p:nvSpPr>
+          <p:cNvPr id="2" name="Заголовок 1"/>
+          <p:cNvSpPr>
+            <a:spLocks noGrp="1"/>
+          </p:cNvSpPr>
+          <p:nvPr>
+            <p:ph type="title"/>
+          </p:nvPr>
+        </p:nvSpPr>
+        <p:spPr>
+          <a:xfrm>
             <a:off x="1484311" y="251689"/>
-            <a:ext cx="10018713" cy="586409"/>
+            <a:ext cx="10018713" cy="1309256"/>
           </a:xfrm>
         </p:spPr>
         <p:txBody>
@@ -6865,7 +7702,22 @@
             </a:r>
             <a:r>
               <a:rPr lang="en-US" dirty="0"/>
-              <a:t> Await</a:t>
+              <a:t> Await (Part 1)</a:t>
+            </a:r>
+            <a:br>
+              <a:rPr lang="en-US" dirty="0"/>
+            </a:br>
+            <a:r>
+              <a:rPr lang="en-US" sz="3100" dirty="0"/>
+              <a:t>How does “await” relate to the current </a:t>
+            </a:r>
+            <a:r>
+              <a:rPr lang="en-US" sz="3100" dirty="0" err="1"/>
+              <a:t>SynchronizationContext</a:t>
+            </a:r>
+            <a:r>
+              <a:rPr lang="en-US" sz="3100" dirty="0"/>
+              <a:t>?</a:t>
             </a:r>
             <a:endParaRPr lang="ru-RU" dirty="0"/>
           </a:p>
@@ -7021,7 +7873,7 @@
 </p:sld>
 </file>
 
-<file path=ppt/slides/slide6.xml><?xml version="1.0" encoding="utf-8"?>
+<file path=ppt/slides/slide8.xml><?xml version="1.0" encoding="utf-8"?>
 <p:sld xmlns:a="http://schemas.openxmlformats.org/drawingml/2006/main" xmlns:r="http://schemas.openxmlformats.org/officeDocument/2006/relationships" xmlns:p="http://schemas.openxmlformats.org/presentationml/2006/main">
   <p:cSld>
     <p:spTree>
@@ -7050,66 +7902,111 @@
         </p:nvSpPr>
         <p:spPr>
           <a:xfrm>
-            <a:off x="1381674" y="46175"/>
-            <a:ext cx="10018713" cy="625764"/>
+            <a:off x="1484311" y="685801"/>
+            <a:ext cx="10018713" cy="838200"/>
           </a:xfrm>
         </p:spPr>
         <p:txBody>
-          <a:bodyPr>
-            <a:normAutofit fontScale="90000"/>
-          </a:bodyPr>
-          <a:lstStyle/>
-          <a:p>
-            <a:r>
-              <a:rPr lang="en-US" dirty="0"/>
-              <a:t>When at last you “await”?</a:t>
-            </a:r>
-            <a:r>
-              <a:rPr lang="ru-RU" dirty="0"/>
-              <a:t> (</a:t>
-            </a:r>
-            <a:r>
-              <a:rPr lang="en-US" dirty="0"/>
-              <a:t>Part 1) </a:t>
+          <a:bodyPr/>
+          <a:lstStyle/>
+          <a:p>
+            <a:r>
+              <a:rPr lang="en-US" dirty="0"/>
+              <a:t>Conclusion from slide</a:t>
             </a:r>
             <a:endParaRPr lang="ru-RU" dirty="0"/>
           </a:p>
         </p:txBody>
       </p:sp>
-      <p:pic>
-        <p:nvPicPr>
-          <p:cNvPr id="8" name="Рисунок 7"/>
-          <p:cNvPicPr>
-            <a:picLocks noChangeAspect="1"/>
-          </p:cNvPicPr>
-          <p:nvPr/>
-        </p:nvPicPr>
-        <p:blipFill>
-          <a:blip r:embed="rId2"/>
-          <a:stretch>
-            <a:fillRect/>
-          </a:stretch>
-        </p:blipFill>
+      <p:sp>
+        <p:nvSpPr>
+          <p:cNvPr id="3" name="Объект 2"/>
+          <p:cNvSpPr>
+            <a:spLocks noGrp="1"/>
+          </p:cNvSpPr>
+          <p:nvPr>
+            <p:ph idx="1"/>
+          </p:nvPr>
+        </p:nvSpPr>
         <p:spPr>
           <a:xfrm>
-            <a:off x="2230017" y="906688"/>
-            <a:ext cx="5882047" cy="5410135"/>
+            <a:off x="1484310" y="2537690"/>
+            <a:ext cx="10018713" cy="2182092"/>
           </a:xfrm>
-          <a:prstGeom prst="rect">
-            <a:avLst/>
-          </a:prstGeom>
         </p:spPr>
-      </p:pic>
-      <p:sp>
-        <p:nvSpPr>
-          <p:cNvPr id="9" name="TextBox 8"/>
+        <p:txBody>
+          <a:bodyPr>
+            <a:normAutofit fontScale="92500" lnSpcReduction="10000"/>
+          </a:bodyPr>
+          <a:lstStyle/>
+          <a:p>
+            <a:r>
+              <a:rPr lang="en-US" dirty="0"/>
+              <a:t>You should not use </a:t>
+            </a:r>
+            <a:r>
+              <a:rPr lang="en-US" dirty="0" err="1"/>
+              <a:t>ConfigureAwait</a:t>
+            </a:r>
+            <a:r>
+              <a:rPr lang="en-US" dirty="0"/>
+              <a:t> when you have code after the await in the method that needs the context.</a:t>
+            </a:r>
+            <a:endParaRPr lang="en-US" dirty="0"/>
+          </a:p>
+          <a:p>
+            <a:pPr marL="0" indent="0">
+              <a:buNone/>
+            </a:pPr>
+            <a:endParaRPr lang="en-US" dirty="0"/>
+          </a:p>
+          <a:p>
+            <a:pPr marL="0" indent="0">
+              <a:buNone/>
+            </a:pPr>
+            <a:r>
+              <a:rPr lang="en-US" sz="1400" dirty="0"/>
+              <a:t>For GUI apps, this includes any code that manipulates GUI elements, writes data-bound properties or depends on a GUI-specific type such as Dispatcher/</a:t>
+            </a:r>
+            <a:r>
+              <a:rPr lang="en-US" sz="1400" dirty="0" err="1"/>
+              <a:t>CoreDispatcher</a:t>
+            </a:r>
+            <a:r>
+              <a:rPr lang="en-US" sz="1400" dirty="0"/>
+              <a:t>.</a:t>
+            </a:r>
+          </a:p>
+          <a:p>
+            <a:pPr marL="0" indent="0">
+              <a:buNone/>
+            </a:pPr>
+            <a:r>
+              <a:rPr lang="en-US" sz="1400" dirty="0"/>
+              <a:t> For ASP.NET apps, this includes any code that uses </a:t>
+            </a:r>
+            <a:r>
+              <a:rPr lang="en-US" sz="1400" dirty="0" err="1"/>
+              <a:t>HttpContext.Current</a:t>
+            </a:r>
+            <a:r>
+              <a:rPr lang="en-US" sz="1400" dirty="0"/>
+              <a:t> or builds an ASP.NET response, including return statements in controller actions</a:t>
+            </a:r>
+            <a:endParaRPr lang="ru-RU" sz="1400" dirty="0"/>
+          </a:p>
+        </p:txBody>
+      </p:sp>
+      <p:sp>
+        <p:nvSpPr>
+          <p:cNvPr id="6" name="TextBox 5"/>
           <p:cNvSpPr txBox="1"/>
           <p:nvPr/>
         </p:nvSpPr>
         <p:spPr>
           <a:xfrm>
-            <a:off x="8478812" y="1026758"/>
-            <a:ext cx="3439486" cy="3416320"/>
+            <a:off x="5362578" y="5890595"/>
+            <a:ext cx="6829422" cy="646331"/>
           </a:xfrm>
           <a:prstGeom prst="rect">
             <a:avLst/>
@@ -7124,65 +8021,28 @@
           <a:p>
             <a:r>
               <a:rPr lang="en-US" dirty="0"/>
-              <a:t>Goals:</a:t>
-            </a:r>
-          </a:p>
-          <a:p>
-            <a:pPr marL="342900" indent="-342900">
-              <a:buFont typeface="+mj-lt"/>
-              <a:buAutoNum type="arabicPeriod"/>
-            </a:pPr>
-            <a:r>
-              <a:rPr lang="en-US" dirty="0"/>
-              <a:t>I want to mix asynchronous and synchronous methods for better performance</a:t>
-            </a:r>
-            <a:endParaRPr lang="ru-RU" dirty="0"/>
-          </a:p>
-          <a:p>
-            <a:endParaRPr lang="en-US" dirty="0"/>
-          </a:p>
-          <a:p>
-            <a:r>
-              <a:rPr lang="en-US" dirty="0"/>
-              <a:t>Questions:</a:t>
-            </a:r>
-          </a:p>
-          <a:p>
-            <a:pPr marL="342900" indent="-342900">
-              <a:buFont typeface="+mj-lt"/>
-              <a:buAutoNum type="arabicPeriod"/>
-            </a:pPr>
-            <a:r>
-              <a:rPr lang="en-US" dirty="0"/>
-              <a:t>What problems does this code contains?</a:t>
-            </a:r>
-          </a:p>
-          <a:p>
-            <a:pPr marL="342900" indent="-342900">
-              <a:buFont typeface="+mj-lt"/>
-              <a:buAutoNum type="arabicPeriod"/>
-            </a:pPr>
-            <a:r>
-              <a:rPr lang="en-US" dirty="0"/>
-              <a:t>How we should resolve this problem?</a:t>
-            </a:r>
-          </a:p>
-          <a:p>
-            <a:pPr marL="342900" indent="-342900">
-              <a:buFont typeface="+mj-lt"/>
-              <a:buAutoNum type="arabicPeriod"/>
-            </a:pPr>
-            <a:endParaRPr lang="en-US" dirty="0"/>
-          </a:p>
-          <a:p>
-            <a:endParaRPr lang="ru-RU" dirty="0"/>
+              <a:t>Source: </a:t>
+            </a:r>
+            <a:r>
+              <a:rPr lang="en-US" dirty="0">
+                <a:hlinkClick r:id="rId2"/>
+              </a:rPr>
+              <a:t>https://msdn.microsoft.com/en-us/magazine/jj991977.aspx</a:t>
+            </a:r>
+            <a:endParaRPr lang="en-US" dirty="0"/>
+          </a:p>
+          <a:p>
+            <a:r>
+              <a:rPr lang="en-US" dirty="0"/>
+              <a:t>Paragraph: Configure Context</a:t>
+            </a:r>
           </a:p>
         </p:txBody>
       </p:sp>
     </p:spTree>
     <p:extLst>
       <p:ext uri="{BB962C8B-B14F-4D97-AF65-F5344CB8AC3E}">
-        <p14:creationId xmlns:p14="http://schemas.microsoft.com/office/powerpoint/2010/main" val="2386486941"/>
+        <p14:creationId xmlns:p14="http://schemas.microsoft.com/office/powerpoint/2010/main" val="394744542"/>
       </p:ext>
     </p:extLst>
   </p:cSld>
@@ -7192,7 +8052,7 @@
 </p:sld>
 </file>
 
-<file path=ppt/slides/slide7.xml><?xml version="1.0" encoding="utf-8"?>
+<file path=ppt/slides/slide9.xml><?xml version="1.0" encoding="utf-8"?>
 <p:sld xmlns:a="http://schemas.openxmlformats.org/drawingml/2006/main" xmlns:r="http://schemas.openxmlformats.org/officeDocument/2006/relationships" xmlns:p="http://schemas.openxmlformats.org/presentationml/2006/main">
   <p:cSld>
     <p:spTree>
@@ -7221,114 +8081,50 @@
         </p:nvSpPr>
         <p:spPr>
           <a:xfrm>
-            <a:off x="1381674" y="46175"/>
-            <a:ext cx="10018713" cy="625764"/>
+            <a:off x="1484311" y="251689"/>
+            <a:ext cx="10018713" cy="1309256"/>
           </a:xfrm>
         </p:spPr>
         <p:txBody>
           <a:bodyPr>
-            <a:normAutofit fontScale="90000"/>
+            <a:normAutofit/>
           </a:bodyPr>
           <a:lstStyle/>
           <a:p>
             <a:r>
-              <a:rPr lang="en-US" dirty="0"/>
-              <a:t>When at last you “await”?</a:t>
-            </a:r>
-            <a:r>
-              <a:rPr lang="ru-RU" dirty="0"/>
-              <a:t> (</a:t>
-            </a:r>
-            <a:r>
-              <a:rPr lang="en-US" dirty="0"/>
-              <a:t>Part 2) </a:t>
-            </a:r>
-            <a:endParaRPr lang="ru-RU" dirty="0"/>
-          </a:p>
-        </p:txBody>
-      </p:sp>
-      <p:sp>
-        <p:nvSpPr>
-          <p:cNvPr id="9" name="TextBox 8"/>
-          <p:cNvSpPr txBox="1"/>
-          <p:nvPr/>
-        </p:nvSpPr>
-        <p:spPr>
-          <a:xfrm>
-            <a:off x="8478812" y="1026758"/>
-            <a:ext cx="3439486" cy="3416320"/>
-          </a:xfrm>
-          <a:prstGeom prst="rect">
-            <a:avLst/>
-          </a:prstGeom>
-          <a:noFill/>
-        </p:spPr>
-        <p:txBody>
-          <a:bodyPr wrap="square" rtlCol="0">
-            <a:spAutoFit/>
-          </a:bodyPr>
-          <a:lstStyle/>
-          <a:p>
-            <a:r>
-              <a:rPr lang="en-US" dirty="0"/>
-              <a:t>Goals:</a:t>
-            </a:r>
-          </a:p>
-          <a:p>
-            <a:pPr marL="342900" indent="-342900">
-              <a:buFont typeface="+mj-lt"/>
-              <a:buAutoNum type="arabicPeriod"/>
-            </a:pPr>
-            <a:r>
-              <a:rPr lang="en-US" dirty="0"/>
-              <a:t>I want to mix asynchronous and synchronous methods for better performance</a:t>
-            </a:r>
-            <a:endParaRPr lang="ru-RU" dirty="0"/>
-          </a:p>
-          <a:p>
-            <a:endParaRPr lang="en-US" dirty="0"/>
-          </a:p>
-          <a:p>
-            <a:r>
-              <a:rPr lang="en-US" dirty="0"/>
-              <a:t>Questions:</a:t>
-            </a:r>
-          </a:p>
-          <a:p>
-            <a:pPr marL="342900" indent="-342900">
-              <a:buFont typeface="+mj-lt"/>
-              <a:buAutoNum type="arabicPeriod"/>
-            </a:pPr>
-            <a:r>
-              <a:rPr lang="en-US" dirty="0"/>
-              <a:t>What problems does this code contains?</a:t>
-            </a:r>
-          </a:p>
-          <a:p>
-            <a:pPr marL="342900" indent="-342900">
-              <a:buFont typeface="+mj-lt"/>
-              <a:buAutoNum type="arabicPeriod"/>
-            </a:pPr>
-            <a:r>
-              <a:rPr lang="en-US" dirty="0"/>
-              <a:t>How we should resolve this problem?</a:t>
-            </a:r>
-          </a:p>
-          <a:p>
-            <a:pPr marL="342900" indent="-342900">
-              <a:buFont typeface="+mj-lt"/>
-              <a:buAutoNum type="arabicPeriod"/>
-            </a:pPr>
-            <a:endParaRPr lang="en-US" dirty="0"/>
-          </a:p>
-          <a:p>
-            <a:endParaRPr lang="ru-RU" dirty="0"/>
+              <a:rPr lang="en-US" sz="3600" dirty="0"/>
+              <a:t>Modification </a:t>
+            </a:r>
+            <a:r>
+              <a:rPr lang="en-US" sz="3600" dirty="0" err="1"/>
+              <a:t>HttpContext</a:t>
+            </a:r>
+            <a:r>
+              <a:rPr lang="en-US" sz="3600" dirty="0"/>
+              <a:t> &amp; </a:t>
+            </a:r>
+            <a:r>
+              <a:rPr lang="en-US" sz="3600" dirty="0" err="1"/>
+              <a:t>Async</a:t>
+            </a:r>
+            <a:r>
+              <a:rPr lang="en-US" sz="3600" dirty="0"/>
+              <a:t> Await (Part 2)</a:t>
+            </a:r>
+            <a:br>
+              <a:rPr lang="en-US" sz="3600" dirty="0"/>
+            </a:br>
+            <a:r>
+              <a:rPr lang="en-US" sz="2800" dirty="0"/>
+              <a:t>Examples context switch without "await"</a:t>
+            </a:r>
+            <a:endParaRPr lang="ru-RU" sz="2800" dirty="0"/>
           </a:p>
         </p:txBody>
       </p:sp>
       <p:pic>
         <p:nvPicPr>
-          <p:cNvPr id="3" name="Рисунок 2"/>
+          <p:cNvPr id="4" name="Рисунок 3"/>
           <p:cNvPicPr>
             <a:picLocks noChangeAspect="1"/>
           </p:cNvPicPr>
@@ -7342,8 +8138,32 @@
         </p:blipFill>
         <p:spPr>
           <a:xfrm>
-            <a:off x="1717577" y="779978"/>
-            <a:ext cx="4823182" cy="5966198"/>
+            <a:off x="504401" y="1560945"/>
+            <a:ext cx="5438775" cy="4857750"/>
+          </a:xfrm>
+          <a:prstGeom prst="rect">
+            <a:avLst/>
+          </a:prstGeom>
+        </p:spPr>
+      </p:pic>
+      <p:pic>
+        <p:nvPicPr>
+          <p:cNvPr id="6" name="Рисунок 5"/>
+          <p:cNvPicPr>
+            <a:picLocks noChangeAspect="1"/>
+          </p:cNvPicPr>
+          <p:nvPr/>
+        </p:nvPicPr>
+        <p:blipFill>
+          <a:blip r:embed="rId3"/>
+          <a:stretch>
+            <a:fillRect/>
+          </a:stretch>
+        </p:blipFill>
+        <p:spPr>
+          <a:xfrm>
+            <a:off x="6302152" y="1560945"/>
+            <a:ext cx="5695950" cy="3457575"/>
           </a:xfrm>
           <a:prstGeom prst="rect">
             <a:avLst/>
@@ -7353,7 +8173,7 @@
     </p:spTree>
     <p:extLst>
       <p:ext uri="{BB962C8B-B14F-4D97-AF65-F5344CB8AC3E}">
-        <p14:creationId xmlns:p14="http://schemas.microsoft.com/office/powerpoint/2010/main" val="894802718"/>
+        <p14:creationId xmlns:p14="http://schemas.microsoft.com/office/powerpoint/2010/main" val="365515660"/>
       </p:ext>
     </p:extLst>
   </p:cSld>

</xml_diff>

<commit_message>
Async Await working with lock
</commit_message>
<xml_diff>
--- a/Async Await and their pitfalls.pptx
+++ b/Async Await and their pitfalls.pptx
@@ -12,12 +12,17 @@
     <p:sldId id="260" r:id="rId6"/>
     <p:sldId id="265" r:id="rId7"/>
     <p:sldId id="259" r:id="rId8"/>
-    <p:sldId id="266" r:id="rId9"/>
-    <p:sldId id="267" r:id="rId10"/>
+    <p:sldId id="267" r:id="rId9"/>
+    <p:sldId id="266" r:id="rId10"/>
     <p:sldId id="261" r:id="rId11"/>
     <p:sldId id="263" r:id="rId12"/>
-    <p:sldId id="268" r:id="rId13"/>
-    <p:sldId id="269" r:id="rId14"/>
+    <p:sldId id="273" r:id="rId13"/>
+    <p:sldId id="274" r:id="rId14"/>
+    <p:sldId id="276" r:id="rId15"/>
+    <p:sldId id="275" r:id="rId16"/>
+    <p:sldId id="269" r:id="rId17"/>
+    <p:sldId id="270" r:id="rId18"/>
+    <p:sldId id="271" r:id="rId19"/>
   </p:sldIdLst>
   <p:sldSz cx="12192000" cy="6858000"/>
   <p:notesSz cx="6858000" cy="9144000"/>
@@ -6580,7 +6585,7 @@
             </a:pPr>
             <a:r>
               <a:rPr lang="en-US" dirty="0"/>
-              <a:t>I want to mix asynchronous and synchronous methods for better performance</a:t>
+              <a:t>I want to mix asynchronous and synchronous methods for check result</a:t>
             </a:r>
             <a:endParaRPr lang="ru-RU" dirty="0"/>
           </a:p>
@@ -6691,47 +6696,158 @@
         </p:nvSpPr>
         <p:spPr>
           <a:xfrm>
-            <a:off x="1484311" y="316348"/>
-            <a:ext cx="10018713" cy="690418"/>
+            <a:off x="1484311" y="685801"/>
+            <a:ext cx="10018713" cy="838200"/>
+          </a:xfrm>
+        </p:spPr>
+        <p:txBody>
+          <a:bodyPr/>
+          <a:lstStyle/>
+          <a:p>
+            <a:r>
+              <a:rPr lang="en-US" dirty="0"/>
+              <a:t>Conclusion from slide</a:t>
+            </a:r>
+            <a:endParaRPr lang="ru-RU" dirty="0"/>
+          </a:p>
+        </p:txBody>
+      </p:sp>
+      <p:sp>
+        <p:nvSpPr>
+          <p:cNvPr id="3" name="Объект 2"/>
+          <p:cNvSpPr>
+            <a:spLocks noGrp="1"/>
+          </p:cNvSpPr>
+          <p:nvPr>
+            <p:ph idx="1"/>
+          </p:nvPr>
+        </p:nvSpPr>
+        <p:spPr>
+          <a:xfrm>
+            <a:off x="1484310" y="2001983"/>
+            <a:ext cx="10018713" cy="2182092"/>
           </a:xfrm>
         </p:spPr>
         <p:txBody>
           <a:bodyPr>
-            <a:normAutofit fontScale="90000"/>
+            <a:normAutofit/>
           </a:bodyPr>
           <a:lstStyle/>
           <a:p>
             <a:r>
               <a:rPr lang="en-US" dirty="0"/>
-              <a:t>Where I can’t use “await”?</a:t>
-            </a:r>
-            <a:endParaRPr lang="ru-RU" dirty="0"/>
-          </a:p>
-        </p:txBody>
-      </p:sp>
-      <p:sp>
-        <p:nvSpPr>
-          <p:cNvPr id="3" name="Объект 2"/>
-          <p:cNvSpPr>
-            <a:spLocks noGrp="1"/>
-          </p:cNvSpPr>
-          <p:nvPr>
-            <p:ph idx="1"/>
-          </p:nvPr>
-        </p:nvSpPr>
-        <p:spPr/>
-        <p:txBody>
-          <a:bodyPr/>
-          <a:lstStyle/>
-          <a:p>
-            <a:endParaRPr lang="ru-RU"/>
+              <a:t>Each </a:t>
+            </a:r>
+            <a:r>
+              <a:rPr lang="en-US" dirty="0" err="1"/>
+              <a:t>async</a:t>
+            </a:r>
+            <a:r>
+              <a:rPr lang="en-US" dirty="0"/>
+              <a:t> method has its own context, so if one </a:t>
+            </a:r>
+            <a:r>
+              <a:rPr lang="en-US" dirty="0" err="1"/>
+              <a:t>async</a:t>
+            </a:r>
+            <a:r>
+              <a:rPr lang="en-US" dirty="0"/>
+              <a:t> method calls another </a:t>
+            </a:r>
+            <a:r>
+              <a:rPr lang="en-US" dirty="0" err="1"/>
+              <a:t>async</a:t>
+            </a:r>
+            <a:r>
+              <a:rPr lang="en-US" dirty="0"/>
+              <a:t> method, their contexts are independent. </a:t>
+            </a:r>
+          </a:p>
+          <a:p>
+            <a:r>
+              <a:rPr lang="en-US" dirty="0"/>
+              <a:t>When you write "Facade" over Task based method you should throwing Task&lt;T&gt; without use "</a:t>
+            </a:r>
+            <a:r>
+              <a:rPr lang="en-US" dirty="0" err="1"/>
+              <a:t>async</a:t>
+            </a:r>
+            <a:r>
+              <a:rPr lang="en-US" dirty="0"/>
+              <a:t> await" on top level. </a:t>
+            </a:r>
+            <a:endParaRPr lang="en-US" dirty="0"/>
+          </a:p>
+        </p:txBody>
+      </p:sp>
+      <p:sp>
+        <p:nvSpPr>
+          <p:cNvPr id="6" name="TextBox 5"/>
+          <p:cNvSpPr txBox="1"/>
+          <p:nvPr/>
+        </p:nvSpPr>
+        <p:spPr>
+          <a:xfrm>
+            <a:off x="1733691" y="5151687"/>
+            <a:ext cx="10449072" cy="1200329"/>
+          </a:xfrm>
+          <a:prstGeom prst="rect">
+            <a:avLst/>
+          </a:prstGeom>
+          <a:noFill/>
+        </p:spPr>
+        <p:txBody>
+          <a:bodyPr wrap="square" rtlCol="0">
+            <a:spAutoFit/>
+          </a:bodyPr>
+          <a:lstStyle/>
+          <a:p>
+            <a:r>
+              <a:rPr lang="en-US" dirty="0"/>
+              <a:t>Source:</a:t>
+            </a:r>
+          </a:p>
+          <a:p>
+            <a:pPr marL="285750" indent="-285750">
+              <a:buFont typeface="Arial" panose="020B0604020202020204" pitchFamily="34" charset="0"/>
+              <a:buChar char="•"/>
+            </a:pPr>
+            <a:r>
+              <a:rPr lang="en-US" dirty="0">
+                <a:hlinkClick r:id="rId2"/>
+              </a:rPr>
+              <a:t>https://msdn.microsoft.com/en-us/magazine/jj991977.aspx</a:t>
+            </a:r>
+            <a:r>
+              <a:rPr lang="en-US" dirty="0"/>
+              <a:t> (Paragraph: Configure Context)</a:t>
+            </a:r>
+          </a:p>
+          <a:p>
+            <a:r>
+              <a:rPr lang="en-US" dirty="0"/>
+              <a:t>Example:</a:t>
+            </a:r>
+          </a:p>
+          <a:p>
+            <a:pPr marL="285750" indent="-285750">
+              <a:buFont typeface="Arial" panose="020B0604020202020204" pitchFamily="34" charset="0"/>
+              <a:buChar char="•"/>
+            </a:pPr>
+            <a:r>
+              <a:rPr lang="en-US" dirty="0">
+                <a:hlinkClick r:id="rId3"/>
+              </a:rPr>
+              <a:t>https://github.com/dotnet/corefx/blob/master/src/System.Net.Http/src/System/Net/Http/HttpClient.cs</a:t>
+            </a:r>
+            <a:endParaRPr lang="en-US" dirty="0"/>
           </a:p>
         </p:txBody>
       </p:sp>
     </p:spTree>
     <p:extLst>
       <p:ext uri="{BB962C8B-B14F-4D97-AF65-F5344CB8AC3E}">
-        <p14:creationId xmlns:p14="http://schemas.microsoft.com/office/powerpoint/2010/main" val="4084537470"/>
+        <p14:creationId xmlns:p14="http://schemas.microsoft.com/office/powerpoint/2010/main" val="419685139"/>
       </p:ext>
     </p:extLst>
   </p:cSld>
@@ -6770,8 +6886,506 @@
         </p:nvSpPr>
         <p:spPr>
           <a:xfrm>
-            <a:off x="1484311" y="316348"/>
-            <a:ext cx="10018713" cy="690418"/>
+            <a:off x="1484311" y="110835"/>
+            <a:ext cx="10018713" cy="1597891"/>
+          </a:xfrm>
+        </p:spPr>
+        <p:txBody>
+          <a:bodyPr>
+            <a:normAutofit/>
+          </a:bodyPr>
+          <a:lstStyle/>
+          <a:p>
+            <a:r>
+              <a:rPr lang="en-US" sz="3600" dirty="0"/>
+              <a:t>What happens when I combining "await" and synchronization primitives. (Part 1)</a:t>
+            </a:r>
+            <a:endParaRPr lang="ru-RU" sz="3600" dirty="0"/>
+          </a:p>
+        </p:txBody>
+      </p:sp>
+      <p:sp>
+        <p:nvSpPr>
+          <p:cNvPr id="5" name="TextBox 4"/>
+          <p:cNvSpPr txBox="1"/>
+          <p:nvPr/>
+        </p:nvSpPr>
+        <p:spPr>
+          <a:xfrm>
+            <a:off x="7241581" y="1932593"/>
+            <a:ext cx="3611588" cy="2862322"/>
+          </a:xfrm>
+          <a:prstGeom prst="rect">
+            <a:avLst/>
+          </a:prstGeom>
+          <a:noFill/>
+        </p:spPr>
+        <p:txBody>
+          <a:bodyPr wrap="square" rtlCol="0">
+            <a:spAutoFit/>
+          </a:bodyPr>
+          <a:lstStyle/>
+          <a:p>
+            <a:r>
+              <a:rPr lang="en-US" dirty="0"/>
+              <a:t>Goals:</a:t>
+            </a:r>
+          </a:p>
+          <a:p>
+            <a:endParaRPr lang="en-US" dirty="0"/>
+          </a:p>
+          <a:p>
+            <a:pPr marL="342900" indent="-342900">
+              <a:buFont typeface="+mj-lt"/>
+              <a:buAutoNum type="arabicPeriod"/>
+            </a:pPr>
+            <a:r>
+              <a:rPr lang="en-US" dirty="0"/>
+              <a:t>We have a shared resource access to which via Lock</a:t>
+            </a:r>
+            <a:endParaRPr lang="ru-RU" dirty="0"/>
+          </a:p>
+          <a:p>
+            <a:endParaRPr lang="ru-RU" dirty="0"/>
+          </a:p>
+          <a:p>
+            <a:r>
+              <a:rPr lang="en-US" dirty="0"/>
+              <a:t>Questions:</a:t>
+            </a:r>
+          </a:p>
+          <a:p>
+            <a:endParaRPr lang="en-US" dirty="0"/>
+          </a:p>
+          <a:p>
+            <a:pPr marL="342900" indent="-342900">
+              <a:buFont typeface="+mj-lt"/>
+              <a:buAutoNum type="arabicPeriod"/>
+            </a:pPr>
+            <a:r>
+              <a:rPr lang="en-US" dirty="0"/>
+              <a:t>Which method will work?</a:t>
+            </a:r>
+          </a:p>
+          <a:p>
+            <a:pPr marL="342900" indent="-342900">
+              <a:buFont typeface="+mj-lt"/>
+              <a:buAutoNum type="arabicPeriod"/>
+            </a:pPr>
+            <a:r>
+              <a:rPr lang="en-US" dirty="0"/>
+              <a:t>How long the methods will execution?</a:t>
+            </a:r>
+            <a:endParaRPr lang="ru-RU" dirty="0"/>
+          </a:p>
+        </p:txBody>
+      </p:sp>
+      <p:pic>
+        <p:nvPicPr>
+          <p:cNvPr id="6" name="Рисунок 5"/>
+          <p:cNvPicPr>
+            <a:picLocks noChangeAspect="1"/>
+          </p:cNvPicPr>
+          <p:nvPr/>
+        </p:nvPicPr>
+        <p:blipFill>
+          <a:blip r:embed="rId2"/>
+          <a:stretch>
+            <a:fillRect/>
+          </a:stretch>
+        </p:blipFill>
+        <p:spPr>
+          <a:xfrm>
+            <a:off x="1934002" y="1708726"/>
+            <a:ext cx="4657725" cy="4972050"/>
+          </a:xfrm>
+          <a:prstGeom prst="rect">
+            <a:avLst/>
+          </a:prstGeom>
+        </p:spPr>
+      </p:pic>
+    </p:spTree>
+    <p:extLst>
+      <p:ext uri="{BB962C8B-B14F-4D97-AF65-F5344CB8AC3E}">
+        <p14:creationId xmlns:p14="http://schemas.microsoft.com/office/powerpoint/2010/main" val="1477021129"/>
+      </p:ext>
+    </p:extLst>
+  </p:cSld>
+  <p:clrMapOvr>
+    <a:masterClrMapping/>
+  </p:clrMapOvr>
+</p:sld>
+</file>
+
+<file path=ppt/slides/slide14.xml><?xml version="1.0" encoding="utf-8"?>
+<p:sld xmlns:a="http://schemas.openxmlformats.org/drawingml/2006/main" xmlns:r="http://schemas.openxmlformats.org/officeDocument/2006/relationships" xmlns:p="http://schemas.openxmlformats.org/presentationml/2006/main">
+  <p:cSld>
+    <p:spTree>
+      <p:nvGrpSpPr>
+        <p:cNvPr id="1" name=""/>
+        <p:cNvGrpSpPr/>
+        <p:nvPr/>
+      </p:nvGrpSpPr>
+      <p:grpSpPr>
+        <a:xfrm>
+          <a:off x="0" y="0"/>
+          <a:ext cx="0" cy="0"/>
+          <a:chOff x="0" y="0"/>
+          <a:chExt cx="0" cy="0"/>
+        </a:xfrm>
+      </p:grpSpPr>
+      <p:sp>
+        <p:nvSpPr>
+          <p:cNvPr id="2" name="Заголовок 1"/>
+          <p:cNvSpPr>
+            <a:spLocks noGrp="1"/>
+          </p:cNvSpPr>
+          <p:nvPr>
+            <p:ph type="title"/>
+          </p:nvPr>
+        </p:nvSpPr>
+        <p:spPr>
+          <a:xfrm>
+            <a:off x="1484311" y="110835"/>
+            <a:ext cx="10018713" cy="1597891"/>
+          </a:xfrm>
+        </p:spPr>
+        <p:txBody>
+          <a:bodyPr>
+            <a:normAutofit/>
+          </a:bodyPr>
+          <a:lstStyle/>
+          <a:p>
+            <a:r>
+              <a:rPr lang="en-US" sz="3600" dirty="0"/>
+              <a:t>What happens when I combining "await" and synchronization primitives. (Part 2)</a:t>
+            </a:r>
+            <a:endParaRPr lang="ru-RU" sz="3600" dirty="0"/>
+          </a:p>
+        </p:txBody>
+      </p:sp>
+      <p:pic>
+        <p:nvPicPr>
+          <p:cNvPr id="3" name="Рисунок 2"/>
+          <p:cNvPicPr>
+            <a:picLocks noChangeAspect="1"/>
+          </p:cNvPicPr>
+          <p:nvPr/>
+        </p:nvPicPr>
+        <p:blipFill>
+          <a:blip r:embed="rId2"/>
+          <a:stretch>
+            <a:fillRect/>
+          </a:stretch>
+        </p:blipFill>
+        <p:spPr>
+          <a:xfrm>
+            <a:off x="1484311" y="1910209"/>
+            <a:ext cx="5416943" cy="3622373"/>
+          </a:xfrm>
+          <a:prstGeom prst="rect">
+            <a:avLst/>
+          </a:prstGeom>
+        </p:spPr>
+      </p:pic>
+    </p:spTree>
+    <p:extLst>
+      <p:ext uri="{BB962C8B-B14F-4D97-AF65-F5344CB8AC3E}">
+        <p14:creationId xmlns:p14="http://schemas.microsoft.com/office/powerpoint/2010/main" val="3084065631"/>
+      </p:ext>
+    </p:extLst>
+  </p:cSld>
+  <p:clrMapOvr>
+    <a:masterClrMapping/>
+  </p:clrMapOvr>
+</p:sld>
+</file>
+
+<file path=ppt/slides/slide15.xml><?xml version="1.0" encoding="utf-8"?>
+<p:sld xmlns:a="http://schemas.openxmlformats.org/drawingml/2006/main" xmlns:r="http://schemas.openxmlformats.org/officeDocument/2006/relationships" xmlns:p="http://schemas.openxmlformats.org/presentationml/2006/main">
+  <p:cSld>
+    <p:spTree>
+      <p:nvGrpSpPr>
+        <p:cNvPr id="1" name=""/>
+        <p:cNvGrpSpPr/>
+        <p:nvPr/>
+      </p:nvGrpSpPr>
+      <p:grpSpPr>
+        <a:xfrm>
+          <a:off x="0" y="0"/>
+          <a:ext cx="0" cy="0"/>
+          <a:chOff x="0" y="0"/>
+          <a:chExt cx="0" cy="0"/>
+        </a:xfrm>
+      </p:grpSpPr>
+      <p:sp>
+        <p:nvSpPr>
+          <p:cNvPr id="2" name="Заголовок 1"/>
+          <p:cNvSpPr>
+            <a:spLocks noGrp="1"/>
+          </p:cNvSpPr>
+          <p:nvPr>
+            <p:ph type="title"/>
+          </p:nvPr>
+        </p:nvSpPr>
+        <p:spPr>
+          <a:xfrm>
+            <a:off x="1484311" y="685801"/>
+            <a:ext cx="10018713" cy="838200"/>
+          </a:xfrm>
+        </p:spPr>
+        <p:txBody>
+          <a:bodyPr/>
+          <a:lstStyle/>
+          <a:p>
+            <a:r>
+              <a:rPr lang="en-US" dirty="0"/>
+              <a:t>Conclusion from slide</a:t>
+            </a:r>
+            <a:endParaRPr lang="ru-RU" dirty="0"/>
+          </a:p>
+        </p:txBody>
+      </p:sp>
+      <p:sp>
+        <p:nvSpPr>
+          <p:cNvPr id="3" name="Объект 2"/>
+          <p:cNvSpPr>
+            <a:spLocks noGrp="1"/>
+          </p:cNvSpPr>
+          <p:nvPr>
+            <p:ph idx="1"/>
+          </p:nvPr>
+        </p:nvSpPr>
+        <p:spPr>
+          <a:xfrm>
+            <a:off x="1484310" y="1985816"/>
+            <a:ext cx="10018713" cy="2641601"/>
+          </a:xfrm>
+        </p:spPr>
+        <p:txBody>
+          <a:bodyPr>
+            <a:normAutofit fontScale="92500" lnSpcReduction="20000"/>
+          </a:bodyPr>
+          <a:lstStyle/>
+          <a:p>
+            <a:r>
+              <a:rPr lang="en-US" sz="2600" dirty="0"/>
+              <a:t>You can’t use await inside of a lock/</a:t>
+            </a:r>
+            <a:r>
+              <a:rPr lang="en-US" sz="2600" dirty="0" err="1"/>
+              <a:t>SyncLock</a:t>
+            </a:r>
+            <a:r>
+              <a:rPr lang="en-US" sz="2600" dirty="0"/>
+              <a:t> block.</a:t>
+            </a:r>
+          </a:p>
+          <a:p>
+            <a:r>
+              <a:rPr lang="en-US" sz="2600" dirty="0"/>
+              <a:t>You can also read about building a variety of custom </a:t>
+            </a:r>
+            <a:r>
+              <a:rPr lang="en-US" sz="2600" dirty="0" err="1"/>
+              <a:t>async</a:t>
+            </a:r>
+            <a:r>
+              <a:rPr lang="en-US" sz="2600" dirty="0"/>
+              <a:t> synchronization primitives at:</a:t>
+            </a:r>
+          </a:p>
+          <a:p>
+            <a:pPr marL="0" indent="0">
+              <a:buNone/>
+            </a:pPr>
+            <a:endParaRPr lang="en-US" dirty="0"/>
+          </a:p>
+          <a:p>
+            <a:pPr marL="0" indent="0">
+              <a:buNone/>
+            </a:pPr>
+            <a:r>
+              <a:rPr lang="en-US" sz="1400" dirty="0"/>
+              <a:t>Building </a:t>
+            </a:r>
+            <a:r>
+              <a:rPr lang="en-US" sz="1400" dirty="0" err="1"/>
+              <a:t>Async</a:t>
+            </a:r>
+            <a:r>
+              <a:rPr lang="en-US" sz="1400" dirty="0"/>
+              <a:t> Coordination Primitives, Part 1: </a:t>
+            </a:r>
+            <a:r>
+              <a:rPr lang="en-US" sz="1400" dirty="0" err="1"/>
+              <a:t>AsyncManualResetEvent</a:t>
+            </a:r>
+            <a:endParaRPr lang="en-US" sz="1400" dirty="0"/>
+          </a:p>
+          <a:p>
+            <a:pPr marL="0" indent="0">
+              <a:buNone/>
+            </a:pPr>
+            <a:r>
+              <a:rPr lang="en-US" sz="1400" dirty="0"/>
+              <a:t>...</a:t>
+            </a:r>
+          </a:p>
+          <a:p>
+            <a:pPr marL="0" indent="0">
+              <a:buNone/>
+            </a:pPr>
+            <a:r>
+              <a:rPr lang="en-US" sz="1400" dirty="0"/>
+              <a:t>Building </a:t>
+            </a:r>
+            <a:r>
+              <a:rPr lang="en-US" sz="1400" dirty="0" err="1"/>
+              <a:t>Async</a:t>
+            </a:r>
+            <a:r>
+              <a:rPr lang="en-US" sz="1400" dirty="0"/>
+              <a:t> Coordination Primitives, Part 6: </a:t>
+            </a:r>
+            <a:r>
+              <a:rPr lang="en-US" sz="1400" dirty="0" err="1"/>
+              <a:t>AsyncLock</a:t>
+            </a:r>
+            <a:endParaRPr lang="en-US" sz="1400" dirty="0"/>
+          </a:p>
+          <a:p>
+            <a:pPr marL="0" indent="0">
+              <a:buNone/>
+            </a:pPr>
+            <a:r>
+              <a:rPr lang="en-US" sz="1400" dirty="0"/>
+              <a:t>Building </a:t>
+            </a:r>
+            <a:r>
+              <a:rPr lang="en-US" sz="1400" dirty="0" err="1"/>
+              <a:t>Async</a:t>
+            </a:r>
+            <a:r>
+              <a:rPr lang="en-US" sz="1400" dirty="0"/>
+              <a:t> Coordination Primitives, Part 7: </a:t>
+            </a:r>
+            <a:r>
+              <a:rPr lang="en-US" sz="1400" dirty="0" err="1"/>
+              <a:t>AsyncReaderWriterLock</a:t>
+            </a:r>
+            <a:endParaRPr lang="en-US" sz="1400" dirty="0"/>
+          </a:p>
+        </p:txBody>
+      </p:sp>
+      <p:sp>
+        <p:nvSpPr>
+          <p:cNvPr id="6" name="TextBox 5"/>
+          <p:cNvSpPr txBox="1"/>
+          <p:nvPr/>
+        </p:nvSpPr>
+        <p:spPr>
+          <a:xfrm>
+            <a:off x="1791854" y="5151687"/>
+            <a:ext cx="10400145" cy="1477328"/>
+          </a:xfrm>
+          <a:prstGeom prst="rect">
+            <a:avLst/>
+          </a:prstGeom>
+          <a:noFill/>
+        </p:spPr>
+        <p:txBody>
+          <a:bodyPr wrap="square" rtlCol="0">
+            <a:spAutoFit/>
+          </a:bodyPr>
+          <a:lstStyle/>
+          <a:p>
+            <a:r>
+              <a:rPr lang="en-US" dirty="0"/>
+              <a:t>Source:</a:t>
+            </a:r>
+          </a:p>
+          <a:p>
+            <a:pPr marL="285750" indent="-285750">
+              <a:buFont typeface="Arial" panose="020B0604020202020204" pitchFamily="34" charset="0"/>
+              <a:buChar char="•"/>
+            </a:pPr>
+            <a:r>
+              <a:rPr lang="en-US" dirty="0">
+                <a:hlinkClick r:id="rId2"/>
+              </a:rPr>
+              <a:t>https://blogs.msdn.microsoft.com/pfxteam/2012/04/12/asyncawait-faq/</a:t>
+            </a:r>
+            <a:r>
+              <a:rPr lang="en-US" dirty="0"/>
+              <a:t> (Where can’t I use “await”?)</a:t>
+            </a:r>
+          </a:p>
+          <a:p>
+            <a:r>
+              <a:rPr lang="en-US" dirty="0"/>
+              <a:t>Example:</a:t>
+            </a:r>
+          </a:p>
+          <a:p>
+            <a:pPr marL="285750" indent="-285750">
+              <a:buFont typeface="Arial" panose="020B0604020202020204" pitchFamily="34" charset="0"/>
+              <a:buChar char="•"/>
+            </a:pPr>
+            <a:r>
+              <a:rPr lang="en-US" dirty="0">
+                <a:hlinkClick r:id="rId3"/>
+              </a:rPr>
+              <a:t>https://blogs.msdn.microsoft.com/pfxteam/2012/02/12/building-async-coordination-primitives-part-6-asynclock/</a:t>
+            </a:r>
+            <a:endParaRPr lang="en-US" dirty="0"/>
+          </a:p>
+        </p:txBody>
+      </p:sp>
+    </p:spTree>
+    <p:extLst>
+      <p:ext uri="{BB962C8B-B14F-4D97-AF65-F5344CB8AC3E}">
+        <p14:creationId xmlns:p14="http://schemas.microsoft.com/office/powerpoint/2010/main" val="3096134277"/>
+      </p:ext>
+    </p:extLst>
+  </p:cSld>
+  <p:clrMapOvr>
+    <a:masterClrMapping/>
+  </p:clrMapOvr>
+</p:sld>
+</file>
+
+<file path=ppt/slides/slide16.xml><?xml version="1.0" encoding="utf-8"?>
+<p:sld xmlns:a="http://schemas.openxmlformats.org/drawingml/2006/main" xmlns:r="http://schemas.openxmlformats.org/officeDocument/2006/relationships" xmlns:p="http://schemas.openxmlformats.org/presentationml/2006/main">
+  <p:cSld>
+    <p:spTree>
+      <p:nvGrpSpPr>
+        <p:cNvPr id="1" name=""/>
+        <p:cNvGrpSpPr/>
+        <p:nvPr/>
+      </p:nvGrpSpPr>
+      <p:grpSpPr>
+        <a:xfrm>
+          <a:off x="0" y="0"/>
+          <a:ext cx="0" cy="0"/>
+          <a:chOff x="0" y="0"/>
+          <a:chExt cx="0" cy="0"/>
+        </a:xfrm>
+      </p:grpSpPr>
+      <p:sp>
+        <p:nvSpPr>
+          <p:cNvPr id="2" name="Заголовок 1"/>
+          <p:cNvSpPr>
+            <a:spLocks noGrp="1"/>
+          </p:cNvSpPr>
+          <p:nvPr>
+            <p:ph type="title"/>
+          </p:nvPr>
+        </p:nvSpPr>
+        <p:spPr>
+          <a:xfrm>
+            <a:off x="1484311" y="159333"/>
+            <a:ext cx="10018713" cy="1032161"/>
           </a:xfrm>
         </p:spPr>
         <p:txBody>
@@ -6782,9 +7396,13 @@
           <a:p>
             <a:r>
               <a:rPr lang="en-US" dirty="0"/>
-              <a:t>What happens when I combining "await" and loop.</a:t>
-            </a:r>
-            <a:endParaRPr lang="ru-RU" dirty="0"/>
+              <a:t>What happens when I combining "await" and loop? </a:t>
+            </a:r>
+            <a:r>
+              <a:rPr lang="en-US" sz="3100" dirty="0"/>
+              <a:t>(Part 1)</a:t>
+            </a:r>
+            <a:endParaRPr lang="ru-RU" sz="3100" dirty="0"/>
           </a:p>
         </p:txBody>
       </p:sp>
@@ -6821,7 +7439,7 @@
         <p:spPr>
           <a:xfrm>
             <a:off x="7398157" y="1229010"/>
-            <a:ext cx="3611588" cy="3139321"/>
+            <a:ext cx="3611588" cy="4524315"/>
           </a:xfrm>
           <a:prstGeom prst="rect">
             <a:avLst/>
@@ -6843,20 +7461,27 @@
             <a:endParaRPr lang="en-US" dirty="0"/>
           </a:p>
           <a:p>
-            <a:r>
-              <a:rPr lang="en-US" dirty="0"/>
-              <a:t>Questions:</a:t>
-            </a:r>
-          </a:p>
-          <a:p>
             <a:pPr marL="342900" indent="-342900">
               <a:buFont typeface="+mj-lt"/>
               <a:buAutoNum type="arabicPeriod"/>
             </a:pPr>
             <a:r>
               <a:rPr lang="en-US" dirty="0"/>
-              <a:t>How long the methods will execution?</a:t>
-            </a:r>
+              <a:t>I want to call methods based on Task asynchronously and parallelly.</a:t>
+            </a:r>
+            <a:endParaRPr lang="en-US" dirty="0"/>
+          </a:p>
+          <a:p>
+            <a:endParaRPr lang="en-US" dirty="0"/>
+          </a:p>
+          <a:p>
+            <a:r>
+              <a:rPr lang="en-US" dirty="0"/>
+              <a:t>Questions:</a:t>
+            </a:r>
+          </a:p>
+          <a:p>
+            <a:endParaRPr lang="en-US" dirty="0"/>
           </a:p>
           <a:p>
             <a:pPr marL="342900" indent="-342900">
@@ -6865,31 +7490,7 @@
             </a:pPr>
             <a:r>
               <a:rPr lang="en-US" dirty="0"/>
-              <a:t>What happens when I change </a:t>
-            </a:r>
-            <a:r>
-              <a:rPr lang="en-US" dirty="0" err="1"/>
-              <a:t>Task.Delay</a:t>
-            </a:r>
-            <a:r>
-              <a:rPr lang="en-US" dirty="0"/>
-              <a:t> on </a:t>
-            </a:r>
-            <a:r>
-              <a:rPr lang="en-US" dirty="0" err="1"/>
-              <a:t>HttpClient.Post</a:t>
-            </a:r>
-            <a:r>
-              <a:rPr lang="en-US" dirty="0"/>
-              <a:t> and set </a:t>
-            </a:r>
-            <a:r>
-              <a:rPr lang="en-US" dirty="0" err="1"/>
-              <a:t>maxCount</a:t>
-            </a:r>
-            <a:r>
-              <a:rPr lang="en-US" dirty="0"/>
-              <a:t> = 1000? (What problems)</a:t>
+              <a:t>How long the methods will execution?</a:t>
             </a:r>
           </a:p>
           <a:p>
@@ -6897,6 +7498,48 @@
               <a:buFont typeface="+mj-lt"/>
               <a:buAutoNum type="arabicPeriod"/>
             </a:pPr>
+            <a:r>
+              <a:rPr lang="en-US" dirty="0"/>
+              <a:t>What happens when I change </a:t>
+            </a:r>
+            <a:r>
+              <a:rPr lang="en-US" dirty="0" err="1"/>
+              <a:t>Task.Delay</a:t>
+            </a:r>
+            <a:r>
+              <a:rPr lang="en-US" dirty="0"/>
+              <a:t> on </a:t>
+            </a:r>
+            <a:r>
+              <a:rPr lang="en-US" dirty="0" err="1"/>
+              <a:t>HttpClient.Post</a:t>
+            </a:r>
+            <a:r>
+              <a:rPr lang="en-US" dirty="0"/>
+              <a:t> and set </a:t>
+            </a:r>
+            <a:r>
+              <a:rPr lang="en-US" dirty="0" err="1"/>
+              <a:t>maxCount</a:t>
+            </a:r>
+            <a:r>
+              <a:rPr lang="en-US" dirty="0"/>
+              <a:t> = 1000? (</a:t>
+            </a:r>
+            <a:r>
+              <a:rPr lang="en-US" dirty="0"/>
+              <a:t>What problems do you know?</a:t>
+            </a:r>
+            <a:r>
+              <a:rPr lang="en-US" dirty="0"/>
+              <a:t>)</a:t>
+            </a:r>
+          </a:p>
+          <a:p>
+            <a:pPr marL="342900" indent="-342900">
+              <a:buFont typeface="+mj-lt"/>
+              <a:buAutoNum type="arabicPeriod"/>
+            </a:pPr>
             <a:endParaRPr lang="en-US" dirty="0"/>
           </a:p>
           <a:p>
@@ -6908,6 +7551,350 @@
     <p:extLst>
       <p:ext uri="{BB962C8B-B14F-4D97-AF65-F5344CB8AC3E}">
         <p14:creationId xmlns:p14="http://schemas.microsoft.com/office/powerpoint/2010/main" val="4269881390"/>
+      </p:ext>
+    </p:extLst>
+  </p:cSld>
+  <p:clrMapOvr>
+    <a:masterClrMapping/>
+  </p:clrMapOvr>
+</p:sld>
+</file>
+
+<file path=ppt/slides/slide17.xml><?xml version="1.0" encoding="utf-8"?>
+<p:sld xmlns:a="http://schemas.openxmlformats.org/drawingml/2006/main" xmlns:r="http://schemas.openxmlformats.org/officeDocument/2006/relationships" xmlns:p="http://schemas.openxmlformats.org/presentationml/2006/main">
+  <p:cSld>
+    <p:spTree>
+      <p:nvGrpSpPr>
+        <p:cNvPr id="1" name=""/>
+        <p:cNvGrpSpPr/>
+        <p:nvPr/>
+      </p:nvGrpSpPr>
+      <p:grpSpPr>
+        <a:xfrm>
+          <a:off x="0" y="0"/>
+          <a:ext cx="0" cy="0"/>
+          <a:chOff x="0" y="0"/>
+          <a:chExt cx="0" cy="0"/>
+        </a:xfrm>
+      </p:grpSpPr>
+      <p:sp>
+        <p:nvSpPr>
+          <p:cNvPr id="2" name="Заголовок 1"/>
+          <p:cNvSpPr>
+            <a:spLocks noGrp="1"/>
+          </p:cNvSpPr>
+          <p:nvPr>
+            <p:ph type="title"/>
+          </p:nvPr>
+        </p:nvSpPr>
+        <p:spPr>
+          <a:xfrm>
+            <a:off x="1484311" y="159334"/>
+            <a:ext cx="10018713" cy="616522"/>
+          </a:xfrm>
+        </p:spPr>
+        <p:txBody>
+          <a:bodyPr>
+            <a:normAutofit fontScale="90000"/>
+          </a:bodyPr>
+          <a:lstStyle/>
+          <a:p>
+            <a:r>
+              <a:rPr lang="en-US" sz="3600" dirty="0"/>
+              <a:t>Implementing a simple </a:t>
+            </a:r>
+            <a:r>
+              <a:rPr lang="en-US" sz="3600" dirty="0" err="1"/>
+              <a:t>ForEachAsync</a:t>
+            </a:r>
+            <a:r>
+              <a:rPr lang="en-US" sz="3600" dirty="0"/>
+              <a:t> </a:t>
+            </a:r>
+            <a:r>
+              <a:rPr lang="en-US" sz="3600" dirty="0"/>
+              <a:t>(Part 2)</a:t>
+            </a:r>
+            <a:endParaRPr lang="ru-RU" sz="3600" dirty="0"/>
+          </a:p>
+        </p:txBody>
+      </p:sp>
+      <p:pic>
+        <p:nvPicPr>
+          <p:cNvPr id="7" name="Рисунок 6"/>
+          <p:cNvPicPr>
+            <a:picLocks noChangeAspect="1"/>
+          </p:cNvPicPr>
+          <p:nvPr/>
+        </p:nvPicPr>
+        <p:blipFill>
+          <a:blip r:embed="rId2"/>
+          <a:stretch>
+            <a:fillRect/>
+          </a:stretch>
+        </p:blipFill>
+        <p:spPr>
+          <a:xfrm>
+            <a:off x="6380884" y="1106993"/>
+            <a:ext cx="5491030" cy="4891241"/>
+          </a:xfrm>
+          <a:prstGeom prst="rect">
+            <a:avLst/>
+          </a:prstGeom>
+        </p:spPr>
+      </p:pic>
+      <p:sp>
+        <p:nvSpPr>
+          <p:cNvPr id="8" name="Прямоугольник 7"/>
+          <p:cNvSpPr/>
+          <p:nvPr/>
+        </p:nvSpPr>
+        <p:spPr>
+          <a:xfrm>
+            <a:off x="2327562" y="6329371"/>
+            <a:ext cx="10861964" cy="369332"/>
+          </a:xfrm>
+          <a:prstGeom prst="rect">
+            <a:avLst/>
+          </a:prstGeom>
+        </p:spPr>
+        <p:txBody>
+          <a:bodyPr wrap="square">
+            <a:spAutoFit/>
+          </a:bodyPr>
+          <a:lstStyle/>
+          <a:p>
+            <a:r>
+              <a:rPr lang="en-US" dirty="0"/>
+              <a:t>Source: </a:t>
+            </a:r>
+            <a:r>
+              <a:rPr lang="en-US" dirty="0">
+                <a:hlinkClick r:id="rId3"/>
+              </a:rPr>
+              <a:t>https://blogs.msdn.microsoft.com/pfxteam/2012/03/04/implementing-a-simple-foreachasync/</a:t>
+            </a:r>
+            <a:endParaRPr lang="en-US" dirty="0"/>
+          </a:p>
+        </p:txBody>
+      </p:sp>
+      <p:pic>
+        <p:nvPicPr>
+          <p:cNvPr id="10" name="Рисунок 9"/>
+          <p:cNvPicPr>
+            <a:picLocks noChangeAspect="1"/>
+          </p:cNvPicPr>
+          <p:nvPr/>
+        </p:nvPicPr>
+        <p:blipFill>
+          <a:blip r:embed="rId4"/>
+          <a:stretch>
+            <a:fillRect/>
+          </a:stretch>
+        </p:blipFill>
+        <p:spPr>
+          <a:xfrm>
+            <a:off x="318678" y="1440253"/>
+            <a:ext cx="5849612" cy="4224720"/>
+          </a:xfrm>
+          <a:prstGeom prst="rect">
+            <a:avLst/>
+          </a:prstGeom>
+        </p:spPr>
+      </p:pic>
+    </p:spTree>
+    <p:extLst>
+      <p:ext uri="{BB962C8B-B14F-4D97-AF65-F5344CB8AC3E}">
+        <p14:creationId xmlns:p14="http://schemas.microsoft.com/office/powerpoint/2010/main" val="1595574886"/>
+      </p:ext>
+    </p:extLst>
+  </p:cSld>
+  <p:clrMapOvr>
+    <a:masterClrMapping/>
+  </p:clrMapOvr>
+</p:sld>
+</file>
+
+<file path=ppt/slides/slide18.xml><?xml version="1.0" encoding="utf-8"?>
+<p:sld xmlns:a="http://schemas.openxmlformats.org/drawingml/2006/main" xmlns:r="http://schemas.openxmlformats.org/officeDocument/2006/relationships" xmlns:p="http://schemas.openxmlformats.org/presentationml/2006/main">
+  <p:cSld>
+    <p:spTree>
+      <p:nvGrpSpPr>
+        <p:cNvPr id="1" name=""/>
+        <p:cNvGrpSpPr/>
+        <p:nvPr/>
+      </p:nvGrpSpPr>
+      <p:grpSpPr>
+        <a:xfrm>
+          <a:off x="0" y="0"/>
+          <a:ext cx="0" cy="0"/>
+          <a:chOff x="0" y="0"/>
+          <a:chExt cx="0" cy="0"/>
+        </a:xfrm>
+      </p:grpSpPr>
+      <p:sp>
+        <p:nvSpPr>
+          <p:cNvPr id="2" name="Заголовок 1"/>
+          <p:cNvSpPr>
+            <a:spLocks noGrp="1"/>
+          </p:cNvSpPr>
+          <p:nvPr>
+            <p:ph type="title"/>
+          </p:nvPr>
+        </p:nvSpPr>
+        <p:spPr>
+          <a:xfrm>
+            <a:off x="1484311" y="685801"/>
+            <a:ext cx="10018713" cy="838200"/>
+          </a:xfrm>
+        </p:spPr>
+        <p:txBody>
+          <a:bodyPr/>
+          <a:lstStyle/>
+          <a:p>
+            <a:r>
+              <a:rPr lang="en-US" dirty="0"/>
+              <a:t>Conclusion from slide</a:t>
+            </a:r>
+            <a:endParaRPr lang="ru-RU" dirty="0"/>
+          </a:p>
+        </p:txBody>
+      </p:sp>
+      <p:sp>
+        <p:nvSpPr>
+          <p:cNvPr id="3" name="Объект 2"/>
+          <p:cNvSpPr>
+            <a:spLocks noGrp="1"/>
+          </p:cNvSpPr>
+          <p:nvPr>
+            <p:ph idx="1"/>
+          </p:nvPr>
+        </p:nvSpPr>
+        <p:spPr>
+          <a:xfrm>
+            <a:off x="1484310" y="2537690"/>
+            <a:ext cx="10018713" cy="2182092"/>
+          </a:xfrm>
+        </p:spPr>
+        <p:txBody>
+          <a:bodyPr/>
+          <a:lstStyle/>
+          <a:p>
+            <a:r>
+              <a:rPr lang="en-US" dirty="0"/>
+              <a:t>If you want implement "</a:t>
+            </a:r>
+            <a:r>
+              <a:rPr lang="en-US" dirty="0" err="1"/>
+              <a:t>foreach</a:t>
+            </a:r>
+            <a:r>
+              <a:rPr lang="en-US" dirty="0"/>
+              <a:t> </a:t>
+            </a:r>
+            <a:r>
+              <a:rPr lang="en-US" dirty="0" err="1"/>
+              <a:t>async</a:t>
+            </a:r>
+            <a:r>
+              <a:rPr lang="en-US" dirty="0"/>
+              <a:t>" you could use "</a:t>
+            </a:r>
+            <a:r>
+              <a:rPr lang="en-US" dirty="0" err="1"/>
+              <a:t>Task.WhenAll</a:t>
+            </a:r>
+            <a:r>
+              <a:rPr lang="en-US" dirty="0"/>
+              <a:t>" or "</a:t>
+            </a:r>
+            <a:r>
+              <a:rPr lang="en-US" dirty="0" err="1"/>
+              <a:t>Task.WhenAny</a:t>
+            </a:r>
+            <a:r>
+              <a:rPr lang="en-US" dirty="0"/>
+              <a:t>“ </a:t>
+            </a:r>
+          </a:p>
+          <a:p>
+            <a:pPr marL="0" indent="0">
+              <a:buNone/>
+            </a:pPr>
+            <a:r>
+              <a:rPr lang="en-US" dirty="0"/>
+              <a:t>But you must understand how many tasks will work simultaneously</a:t>
+            </a:r>
+            <a:endParaRPr lang="en-US" dirty="0"/>
+          </a:p>
+        </p:txBody>
+      </p:sp>
+      <p:sp>
+        <p:nvSpPr>
+          <p:cNvPr id="6" name="TextBox 5"/>
+          <p:cNvSpPr txBox="1"/>
+          <p:nvPr/>
+        </p:nvSpPr>
+        <p:spPr>
+          <a:xfrm>
+            <a:off x="1948873" y="5548849"/>
+            <a:ext cx="9984509" cy="1200329"/>
+          </a:xfrm>
+          <a:prstGeom prst="rect">
+            <a:avLst/>
+          </a:prstGeom>
+          <a:noFill/>
+        </p:spPr>
+        <p:txBody>
+          <a:bodyPr wrap="square" rtlCol="0">
+            <a:spAutoFit/>
+          </a:bodyPr>
+          <a:lstStyle/>
+          <a:p>
+            <a:r>
+              <a:rPr lang="en-US" dirty="0"/>
+              <a:t>Sources:</a:t>
+            </a:r>
+          </a:p>
+          <a:p>
+            <a:pPr marL="285750" indent="-285750">
+              <a:buFont typeface="Arial" panose="020B0604020202020204" pitchFamily="34" charset="0"/>
+              <a:buChar char="•"/>
+            </a:pPr>
+            <a:r>
+              <a:rPr lang="en-US" dirty="0">
+                <a:hlinkClick r:id="rId2"/>
+              </a:rPr>
+              <a:t>https://blogs.msdn.microsoft.com/pfxteam/2012/03/04/implementing-a-simple-foreachasync/</a:t>
+            </a:r>
+            <a:endParaRPr lang="en-US" dirty="0"/>
+          </a:p>
+          <a:p>
+            <a:pPr marL="285750" indent="-285750">
+              <a:buFont typeface="Arial" panose="020B0604020202020204" pitchFamily="34" charset="0"/>
+              <a:buChar char="•"/>
+            </a:pPr>
+            <a:r>
+              <a:rPr lang="en-US" dirty="0">
+                <a:hlinkClick r:id="rId3"/>
+              </a:rPr>
+              <a:t>https://blogs.msdn.microsoft.com/pfxteam/2012/03/05/implementing-a-simple-foreachasync-part-2/</a:t>
+            </a:r>
+            <a:endParaRPr lang="en-US" dirty="0"/>
+          </a:p>
+          <a:p>
+            <a:pPr marL="285750" indent="-285750">
+              <a:buFont typeface="Arial" panose="020B0604020202020204" pitchFamily="34" charset="0"/>
+              <a:buChar char="•"/>
+            </a:pPr>
+            <a:endParaRPr lang="en-US" dirty="0"/>
+          </a:p>
+        </p:txBody>
+      </p:sp>
+    </p:spTree>
+    <p:extLst>
+      <p:ext uri="{BB962C8B-B14F-4D97-AF65-F5344CB8AC3E}">
+        <p14:creationId xmlns:p14="http://schemas.microsoft.com/office/powerpoint/2010/main" val="1441713611"/>
       </p:ext>
     </p:extLst>
   </p:cSld>
@@ -7015,7 +8002,7 @@
           <a:p>
             <a:r>
               <a:rPr lang="en-US" dirty="0"/>
-              <a:t>What happens when I combining "await" and loop. Implementing a simple. </a:t>
+              <a:t>What happens when I combining "await" and loop? Implementing a simple. </a:t>
             </a:r>
             <a:r>
               <a:rPr lang="en-US" dirty="0" err="1"/>
@@ -7999,146 +8986,99 @@
         </p:nvSpPr>
         <p:spPr>
           <a:xfrm>
-            <a:off x="1484311" y="685801"/>
-            <a:ext cx="10018713" cy="838200"/>
-          </a:xfrm>
-        </p:spPr>
-        <p:txBody>
-          <a:bodyPr/>
-          <a:lstStyle/>
-          <a:p>
-            <a:r>
-              <a:rPr lang="en-US" dirty="0"/>
-              <a:t>Conclusion from slide</a:t>
-            </a:r>
-            <a:endParaRPr lang="ru-RU" dirty="0"/>
-          </a:p>
-        </p:txBody>
-      </p:sp>
-      <p:sp>
-        <p:nvSpPr>
-          <p:cNvPr id="3" name="Объект 2"/>
-          <p:cNvSpPr>
-            <a:spLocks noGrp="1"/>
-          </p:cNvSpPr>
-          <p:nvPr>
-            <p:ph idx="1"/>
-          </p:nvPr>
-        </p:nvSpPr>
-        <p:spPr>
-          <a:xfrm>
-            <a:off x="1484310" y="2537690"/>
-            <a:ext cx="10018713" cy="2182092"/>
+            <a:off x="1484311" y="251689"/>
+            <a:ext cx="10018713" cy="1309256"/>
           </a:xfrm>
         </p:spPr>
         <p:txBody>
           <a:bodyPr>
-            <a:normAutofit fontScale="92500" lnSpcReduction="10000"/>
+            <a:normAutofit/>
           </a:bodyPr>
           <a:lstStyle/>
           <a:p>
             <a:r>
-              <a:rPr lang="en-US" dirty="0"/>
-              <a:t>You should not use </a:t>
-            </a:r>
-            <a:r>
-              <a:rPr lang="en-US" dirty="0" err="1"/>
-              <a:t>ConfigureAwait</a:t>
-            </a:r>
-            <a:r>
-              <a:rPr lang="en-US" dirty="0"/>
-              <a:t> when you have code after the await in the method that needs the context.</a:t>
-            </a:r>
-          </a:p>
-          <a:p>
-            <a:pPr marL="0" indent="0">
-              <a:buNone/>
-            </a:pPr>
-            <a:endParaRPr lang="en-US" dirty="0"/>
-          </a:p>
-          <a:p>
-            <a:pPr marL="0" indent="0">
-              <a:buNone/>
-            </a:pPr>
-            <a:r>
-              <a:rPr lang="en-US" sz="1400" dirty="0"/>
-              <a:t>For GUI apps, this includes any code that manipulates GUI elements, writes data-bound properties or depends on a GUI-specific type such as Dispatcher/</a:t>
-            </a:r>
-            <a:r>
-              <a:rPr lang="en-US" sz="1400" dirty="0" err="1"/>
-              <a:t>CoreDispatcher</a:t>
-            </a:r>
-            <a:r>
-              <a:rPr lang="en-US" sz="1400" dirty="0"/>
-              <a:t>.</a:t>
-            </a:r>
-          </a:p>
-          <a:p>
-            <a:pPr marL="0" indent="0">
-              <a:buNone/>
-            </a:pPr>
-            <a:r>
-              <a:rPr lang="en-US" sz="1400" dirty="0"/>
-              <a:t> For ASP.NET apps, this includes any code that uses </a:t>
-            </a:r>
-            <a:r>
-              <a:rPr lang="en-US" sz="1400" dirty="0" err="1"/>
-              <a:t>HttpContext.Current</a:t>
-            </a:r>
-            <a:r>
-              <a:rPr lang="en-US" sz="1400" dirty="0"/>
-              <a:t> or builds an ASP.NET response, including return statements in controller actions</a:t>
-            </a:r>
-            <a:endParaRPr lang="ru-RU" sz="1400" dirty="0"/>
-          </a:p>
-        </p:txBody>
-      </p:sp>
-      <p:sp>
-        <p:nvSpPr>
-          <p:cNvPr id="6" name="TextBox 5"/>
-          <p:cNvSpPr txBox="1"/>
+              <a:rPr lang="en-US" sz="3600" dirty="0"/>
+              <a:t>Modification </a:t>
+            </a:r>
+            <a:r>
+              <a:rPr lang="en-US" sz="3600" dirty="0" err="1"/>
+              <a:t>HttpContext</a:t>
+            </a:r>
+            <a:r>
+              <a:rPr lang="en-US" sz="3600" dirty="0"/>
+              <a:t> &amp; </a:t>
+            </a:r>
+            <a:r>
+              <a:rPr lang="en-US" sz="3600" dirty="0" err="1"/>
+              <a:t>Async</a:t>
+            </a:r>
+            <a:r>
+              <a:rPr lang="en-US" sz="3600" dirty="0"/>
+              <a:t> Await (Part 2)</a:t>
+            </a:r>
+            <a:br>
+              <a:rPr lang="en-US" sz="3600" dirty="0"/>
+            </a:br>
+            <a:r>
+              <a:rPr lang="en-US" sz="2800" dirty="0"/>
+              <a:t>Examples context switch without "await"</a:t>
+            </a:r>
+            <a:endParaRPr lang="ru-RU" sz="2800" dirty="0"/>
+          </a:p>
+        </p:txBody>
+      </p:sp>
+      <p:pic>
+        <p:nvPicPr>
+          <p:cNvPr id="4" name="Рисунок 3"/>
+          <p:cNvPicPr>
+            <a:picLocks noChangeAspect="1"/>
+          </p:cNvPicPr>
           <p:nvPr/>
-        </p:nvSpPr>
-        <p:spPr>
-          <a:xfrm>
-            <a:off x="5362578" y="5890595"/>
-            <a:ext cx="6829422" cy="646331"/>
+        </p:nvPicPr>
+        <p:blipFill>
+          <a:blip r:embed="rId2"/>
+          <a:stretch>
+            <a:fillRect/>
+          </a:stretch>
+        </p:blipFill>
+        <p:spPr>
+          <a:xfrm>
+            <a:off x="504401" y="1560945"/>
+            <a:ext cx="5438775" cy="4857750"/>
           </a:xfrm>
           <a:prstGeom prst="rect">
             <a:avLst/>
           </a:prstGeom>
-          <a:noFill/>
-        </p:spPr>
-        <p:txBody>
-          <a:bodyPr wrap="square" rtlCol="0">
-            <a:spAutoFit/>
-          </a:bodyPr>
-          <a:lstStyle/>
-          <a:p>
-            <a:r>
-              <a:rPr lang="en-US" dirty="0"/>
-              <a:t>Source: </a:t>
-            </a:r>
-            <a:r>
-              <a:rPr lang="en-US" dirty="0">
-                <a:hlinkClick r:id="rId2"/>
-              </a:rPr>
-              <a:t>https://msdn.microsoft.com/en-us/magazine/jj991977.aspx</a:t>
-            </a:r>
-            <a:endParaRPr lang="en-US" dirty="0"/>
-          </a:p>
-          <a:p>
-            <a:r>
-              <a:rPr lang="en-US" dirty="0"/>
-              <a:t>Paragraph: Configure Context</a:t>
-            </a:r>
-          </a:p>
-        </p:txBody>
-      </p:sp>
+        </p:spPr>
+      </p:pic>
+      <p:pic>
+        <p:nvPicPr>
+          <p:cNvPr id="6" name="Рисунок 5"/>
+          <p:cNvPicPr>
+            <a:picLocks noChangeAspect="1"/>
+          </p:cNvPicPr>
+          <p:nvPr/>
+        </p:nvPicPr>
+        <p:blipFill>
+          <a:blip r:embed="rId3"/>
+          <a:stretch>
+            <a:fillRect/>
+          </a:stretch>
+        </p:blipFill>
+        <p:spPr>
+          <a:xfrm>
+            <a:off x="6302152" y="1560945"/>
+            <a:ext cx="5695950" cy="3457575"/>
+          </a:xfrm>
+          <a:prstGeom prst="rect">
+            <a:avLst/>
+          </a:prstGeom>
+        </p:spPr>
+      </p:pic>
     </p:spTree>
     <p:extLst>
       <p:ext uri="{BB962C8B-B14F-4D97-AF65-F5344CB8AC3E}">
-        <p14:creationId xmlns:p14="http://schemas.microsoft.com/office/powerpoint/2010/main" val="394744542"/>
+        <p14:creationId xmlns:p14="http://schemas.microsoft.com/office/powerpoint/2010/main" val="365515660"/>
       </p:ext>
     </p:extLst>
   </p:cSld>
@@ -8177,99 +9117,146 @@
         </p:nvSpPr>
         <p:spPr>
           <a:xfrm>
-            <a:off x="1484311" y="251689"/>
-            <a:ext cx="10018713" cy="1309256"/>
+            <a:off x="1484311" y="685801"/>
+            <a:ext cx="10018713" cy="838200"/>
+          </a:xfrm>
+        </p:spPr>
+        <p:txBody>
+          <a:bodyPr/>
+          <a:lstStyle/>
+          <a:p>
+            <a:r>
+              <a:rPr lang="en-US" dirty="0"/>
+              <a:t>Conclusion from slide</a:t>
+            </a:r>
+            <a:endParaRPr lang="ru-RU" dirty="0"/>
+          </a:p>
+        </p:txBody>
+      </p:sp>
+      <p:sp>
+        <p:nvSpPr>
+          <p:cNvPr id="3" name="Объект 2"/>
+          <p:cNvSpPr>
+            <a:spLocks noGrp="1"/>
+          </p:cNvSpPr>
+          <p:nvPr>
+            <p:ph idx="1"/>
+          </p:nvPr>
+        </p:nvSpPr>
+        <p:spPr>
+          <a:xfrm>
+            <a:off x="1484310" y="2537690"/>
+            <a:ext cx="10018713" cy="2182092"/>
           </a:xfrm>
         </p:spPr>
         <p:txBody>
           <a:bodyPr>
-            <a:normAutofit/>
+            <a:normAutofit fontScale="92500" lnSpcReduction="10000"/>
           </a:bodyPr>
           <a:lstStyle/>
           <a:p>
             <a:r>
-              <a:rPr lang="en-US" sz="3600" dirty="0"/>
-              <a:t>Modification </a:t>
-            </a:r>
-            <a:r>
-              <a:rPr lang="en-US" sz="3600" dirty="0" err="1"/>
-              <a:t>HttpContext</a:t>
-            </a:r>
-            <a:r>
-              <a:rPr lang="en-US" sz="3600" dirty="0"/>
-              <a:t> &amp; </a:t>
-            </a:r>
-            <a:r>
-              <a:rPr lang="en-US" sz="3600" dirty="0" err="1"/>
-              <a:t>Async</a:t>
-            </a:r>
-            <a:r>
-              <a:rPr lang="en-US" sz="3600" dirty="0"/>
-              <a:t> Await (Part 2)</a:t>
-            </a:r>
-            <a:br>
-              <a:rPr lang="en-US" sz="3600" dirty="0"/>
-            </a:br>
-            <a:r>
-              <a:rPr lang="en-US" sz="2800" dirty="0"/>
-              <a:t>Examples context switch without "await"</a:t>
-            </a:r>
-            <a:endParaRPr lang="ru-RU" sz="2800" dirty="0"/>
-          </a:p>
-        </p:txBody>
-      </p:sp>
-      <p:pic>
-        <p:nvPicPr>
-          <p:cNvPr id="4" name="Рисунок 3"/>
-          <p:cNvPicPr>
-            <a:picLocks noChangeAspect="1"/>
-          </p:cNvPicPr>
+              <a:rPr lang="en-US" dirty="0"/>
+              <a:t>You should not use </a:t>
+            </a:r>
+            <a:r>
+              <a:rPr lang="en-US" dirty="0" err="1"/>
+              <a:t>ConfigureAwait</a:t>
+            </a:r>
+            <a:r>
+              <a:rPr lang="en-US" dirty="0"/>
+              <a:t> when you have code after the await in the method that needs the context.</a:t>
+            </a:r>
+          </a:p>
+          <a:p>
+            <a:pPr marL="0" indent="0">
+              <a:buNone/>
+            </a:pPr>
+            <a:endParaRPr lang="en-US" dirty="0"/>
+          </a:p>
+          <a:p>
+            <a:pPr marL="0" indent="0">
+              <a:buNone/>
+            </a:pPr>
+            <a:r>
+              <a:rPr lang="en-US" sz="1400" dirty="0"/>
+              <a:t>For GUI apps, this includes any code that manipulates GUI elements, writes data-bound properties or depends on a GUI-specific type such as Dispatcher/</a:t>
+            </a:r>
+            <a:r>
+              <a:rPr lang="en-US" sz="1400" dirty="0" err="1"/>
+              <a:t>CoreDispatcher</a:t>
+            </a:r>
+            <a:r>
+              <a:rPr lang="en-US" sz="1400" dirty="0"/>
+              <a:t>.</a:t>
+            </a:r>
+          </a:p>
+          <a:p>
+            <a:pPr marL="0" indent="0">
+              <a:buNone/>
+            </a:pPr>
+            <a:r>
+              <a:rPr lang="en-US" sz="1400" dirty="0"/>
+              <a:t> For ASP.NET apps, this includes any code that uses </a:t>
+            </a:r>
+            <a:r>
+              <a:rPr lang="en-US" sz="1400" dirty="0" err="1"/>
+              <a:t>HttpContext.Current</a:t>
+            </a:r>
+            <a:r>
+              <a:rPr lang="en-US" sz="1400" dirty="0"/>
+              <a:t> or builds an ASP.NET response, including return statements in controller actions</a:t>
+            </a:r>
+            <a:endParaRPr lang="ru-RU" sz="1400" dirty="0"/>
+          </a:p>
+        </p:txBody>
+      </p:sp>
+      <p:sp>
+        <p:nvSpPr>
+          <p:cNvPr id="6" name="TextBox 5"/>
+          <p:cNvSpPr txBox="1"/>
           <p:nvPr/>
-        </p:nvPicPr>
-        <p:blipFill>
-          <a:blip r:embed="rId2"/>
-          <a:stretch>
-            <a:fillRect/>
-          </a:stretch>
-        </p:blipFill>
-        <p:spPr>
-          <a:xfrm>
-            <a:off x="504401" y="1560945"/>
-            <a:ext cx="5438775" cy="4857750"/>
+        </p:nvSpPr>
+        <p:spPr>
+          <a:xfrm>
+            <a:off x="5362578" y="5890595"/>
+            <a:ext cx="6829422" cy="646331"/>
           </a:xfrm>
           <a:prstGeom prst="rect">
             <a:avLst/>
           </a:prstGeom>
-        </p:spPr>
-      </p:pic>
-      <p:pic>
-        <p:nvPicPr>
-          <p:cNvPr id="6" name="Рисунок 5"/>
-          <p:cNvPicPr>
-            <a:picLocks noChangeAspect="1"/>
-          </p:cNvPicPr>
-          <p:nvPr/>
-        </p:nvPicPr>
-        <p:blipFill>
-          <a:blip r:embed="rId3"/>
-          <a:stretch>
-            <a:fillRect/>
-          </a:stretch>
-        </p:blipFill>
-        <p:spPr>
-          <a:xfrm>
-            <a:off x="6302152" y="1560945"/>
-            <a:ext cx="5695950" cy="3457575"/>
-          </a:xfrm>
-          <a:prstGeom prst="rect">
-            <a:avLst/>
-          </a:prstGeom>
-        </p:spPr>
-      </p:pic>
+          <a:noFill/>
+        </p:spPr>
+        <p:txBody>
+          <a:bodyPr wrap="square" rtlCol="0">
+            <a:spAutoFit/>
+          </a:bodyPr>
+          <a:lstStyle/>
+          <a:p>
+            <a:r>
+              <a:rPr lang="en-US" dirty="0"/>
+              <a:t>Source: </a:t>
+            </a:r>
+            <a:r>
+              <a:rPr lang="en-US" dirty="0">
+                <a:hlinkClick r:id="rId2"/>
+              </a:rPr>
+              <a:t>https://msdn.microsoft.com/en-us/magazine/jj991977.aspx</a:t>
+            </a:r>
+            <a:endParaRPr lang="en-US" dirty="0"/>
+          </a:p>
+          <a:p>
+            <a:r>
+              <a:rPr lang="en-US" dirty="0"/>
+              <a:t>Paragraph: Configure Context</a:t>
+            </a:r>
+          </a:p>
+        </p:txBody>
+      </p:sp>
     </p:spTree>
     <p:extLst>
       <p:ext uri="{BB962C8B-B14F-4D97-AF65-F5344CB8AC3E}">
-        <p14:creationId xmlns:p14="http://schemas.microsoft.com/office/powerpoint/2010/main" val="365515660"/>
+        <p14:creationId xmlns:p14="http://schemas.microsoft.com/office/powerpoint/2010/main" val="394744542"/>
       </p:ext>
     </p:extLst>
   </p:cSld>

</xml_diff>